<commit_message>
updates to slides and demos
</commit_message>
<xml_diff>
--- a/ContainersInTheCloud.pptx
+++ b/ContainersInTheCloud.pptx
@@ -5,31 +5,38 @@
     <p:sldMasterId id="2147483648" r:id="rId1"/>
   </p:sldMasterIdLst>
   <p:notesMasterIdLst>
-    <p:notesMasterId r:id="rId24"/>
+    <p:notesMasterId r:id="rId31"/>
   </p:notesMasterIdLst>
   <p:sldIdLst>
     <p:sldId id="256" r:id="rId2"/>
     <p:sldId id="282" r:id="rId3"/>
     <p:sldId id="338" r:id="rId4"/>
     <p:sldId id="264" r:id="rId5"/>
-    <p:sldId id="339" r:id="rId6"/>
-    <p:sldId id="313" r:id="rId7"/>
-    <p:sldId id="331" r:id="rId8"/>
-    <p:sldId id="330" r:id="rId9"/>
-    <p:sldId id="325" r:id="rId10"/>
-    <p:sldId id="332" r:id="rId11"/>
-    <p:sldId id="329" r:id="rId12"/>
-    <p:sldId id="327" r:id="rId13"/>
-    <p:sldId id="333" r:id="rId14"/>
-    <p:sldId id="328" r:id="rId15"/>
-    <p:sldId id="326" r:id="rId16"/>
-    <p:sldId id="334" r:id="rId17"/>
-    <p:sldId id="314" r:id="rId18"/>
-    <p:sldId id="335" r:id="rId19"/>
-    <p:sldId id="336" r:id="rId20"/>
-    <p:sldId id="337" r:id="rId21"/>
-    <p:sldId id="284" r:id="rId22"/>
-    <p:sldId id="290" r:id="rId23"/>
+    <p:sldId id="346" r:id="rId6"/>
+    <p:sldId id="347" r:id="rId7"/>
+    <p:sldId id="341" r:id="rId8"/>
+    <p:sldId id="342" r:id="rId9"/>
+    <p:sldId id="313" r:id="rId10"/>
+    <p:sldId id="331" r:id="rId11"/>
+    <p:sldId id="330" r:id="rId12"/>
+    <p:sldId id="325" r:id="rId13"/>
+    <p:sldId id="332" r:id="rId14"/>
+    <p:sldId id="329" r:id="rId15"/>
+    <p:sldId id="327" r:id="rId16"/>
+    <p:sldId id="333" r:id="rId17"/>
+    <p:sldId id="340" r:id="rId18"/>
+    <p:sldId id="328" r:id="rId19"/>
+    <p:sldId id="326" r:id="rId20"/>
+    <p:sldId id="334" r:id="rId21"/>
+    <p:sldId id="345" r:id="rId22"/>
+    <p:sldId id="314" r:id="rId23"/>
+    <p:sldId id="335" r:id="rId24"/>
+    <p:sldId id="348" r:id="rId25"/>
+    <p:sldId id="336" r:id="rId26"/>
+    <p:sldId id="349" r:id="rId27"/>
+    <p:sldId id="337" r:id="rId28"/>
+    <p:sldId id="284" r:id="rId29"/>
+    <p:sldId id="290" r:id="rId30"/>
   </p:sldIdLst>
   <p:sldSz cx="12192000" cy="6858000"/>
   <p:notesSz cx="6858000" cy="9144000"/>
@@ -229,7 +236,7 @@
           <a:p>
             <a:fld id="{5DD5D27D-F6C1-457C-97EB-5B89E5036C9E}" type="datetimeFigureOut">
               <a:rPr lang="en-IE" smtClean="0"/>
-              <a:t>30/04/2018</a:t>
+              <a:t>06/05/2018</a:t>
             </a:fld>
             <a:endParaRPr lang="en-IE"/>
           </a:p>
@@ -628,7 +635,7 @@
           <a:p>
             <a:fld id="{A64C863B-FA9B-4512-A178-D5CD000B838D}" type="datetimeFigureOut">
               <a:rPr lang="en-GB" smtClean="0"/>
-              <a:t>30/04/2018</a:t>
+              <a:t>06/05/2018</a:t>
             </a:fld>
             <a:endParaRPr lang="en-GB"/>
           </a:p>
@@ -798,7 +805,7 @@
           <a:p>
             <a:fld id="{A64C863B-FA9B-4512-A178-D5CD000B838D}" type="datetimeFigureOut">
               <a:rPr lang="en-GB" smtClean="0"/>
-              <a:t>30/04/2018</a:t>
+              <a:t>06/05/2018</a:t>
             </a:fld>
             <a:endParaRPr lang="en-GB"/>
           </a:p>
@@ -978,7 +985,7 @@
           <a:p>
             <a:fld id="{A64C863B-FA9B-4512-A178-D5CD000B838D}" type="datetimeFigureOut">
               <a:rPr lang="en-GB" smtClean="0"/>
-              <a:t>30/04/2018</a:t>
+              <a:t>06/05/2018</a:t>
             </a:fld>
             <a:endParaRPr lang="en-GB"/>
           </a:p>
@@ -1148,7 +1155,7 @@
           <a:p>
             <a:fld id="{A64C863B-FA9B-4512-A178-D5CD000B838D}" type="datetimeFigureOut">
               <a:rPr lang="en-GB" smtClean="0"/>
-              <a:t>30/04/2018</a:t>
+              <a:t>06/05/2018</a:t>
             </a:fld>
             <a:endParaRPr lang="en-GB"/>
           </a:p>
@@ -1394,7 +1401,7 @@
           <a:p>
             <a:fld id="{A64C863B-FA9B-4512-A178-D5CD000B838D}" type="datetimeFigureOut">
               <a:rPr lang="en-GB" smtClean="0"/>
-              <a:t>30/04/2018</a:t>
+              <a:t>06/05/2018</a:t>
             </a:fld>
             <a:endParaRPr lang="en-GB"/>
           </a:p>
@@ -1626,7 +1633,7 @@
           <a:p>
             <a:fld id="{A64C863B-FA9B-4512-A178-D5CD000B838D}" type="datetimeFigureOut">
               <a:rPr lang="en-GB" smtClean="0"/>
-              <a:t>30/04/2018</a:t>
+              <a:t>06/05/2018</a:t>
             </a:fld>
             <a:endParaRPr lang="en-GB"/>
           </a:p>
@@ -1993,7 +2000,7 @@
           <a:p>
             <a:fld id="{A64C863B-FA9B-4512-A178-D5CD000B838D}" type="datetimeFigureOut">
               <a:rPr lang="en-GB" smtClean="0"/>
-              <a:t>30/04/2018</a:t>
+              <a:t>06/05/2018</a:t>
             </a:fld>
             <a:endParaRPr lang="en-GB"/>
           </a:p>
@@ -2111,7 +2118,7 @@
           <a:p>
             <a:fld id="{A64C863B-FA9B-4512-A178-D5CD000B838D}" type="datetimeFigureOut">
               <a:rPr lang="en-GB" smtClean="0"/>
-              <a:t>30/04/2018</a:t>
+              <a:t>06/05/2018</a:t>
             </a:fld>
             <a:endParaRPr lang="en-GB"/>
           </a:p>
@@ -2206,7 +2213,7 @@
           <a:p>
             <a:fld id="{A64C863B-FA9B-4512-A178-D5CD000B838D}" type="datetimeFigureOut">
               <a:rPr lang="en-GB" smtClean="0"/>
-              <a:t>30/04/2018</a:t>
+              <a:t>06/05/2018</a:t>
             </a:fld>
             <a:endParaRPr lang="en-GB"/>
           </a:p>
@@ -2483,7 +2490,7 @@
           <a:p>
             <a:fld id="{A64C863B-FA9B-4512-A178-D5CD000B838D}" type="datetimeFigureOut">
               <a:rPr lang="en-GB" smtClean="0"/>
-              <a:t>30/04/2018</a:t>
+              <a:t>06/05/2018</a:t>
             </a:fld>
             <a:endParaRPr lang="en-GB"/>
           </a:p>
@@ -2736,7 +2743,7 @@
           <a:p>
             <a:fld id="{A64C863B-FA9B-4512-A178-D5CD000B838D}" type="datetimeFigureOut">
               <a:rPr lang="en-GB" smtClean="0"/>
-              <a:t>30/04/2018</a:t>
+              <a:t>06/05/2018</a:t>
             </a:fld>
             <a:endParaRPr lang="en-GB"/>
           </a:p>
@@ -2958,7 +2965,7 @@
           <a:p>
             <a:fld id="{A64C863B-FA9B-4512-A178-D5CD000B838D}" type="datetimeFigureOut">
               <a:rPr lang="en-GB" smtClean="0"/>
-              <a:t>30/04/2018</a:t>
+              <a:t>06/05/2018</a:t>
             </a:fld>
             <a:endParaRPr lang="en-GB"/>
           </a:p>
@@ -3477,7 +3484,7 @@
                   </a:schemeClr>
                 </a:solidFill>
               </a:rPr>
-              <a:t>Header</a:t>
+              <a:t>VM Templates</a:t>
             </a:r>
           </a:p>
         </p:txBody>
@@ -3502,14 +3509,51 @@
             <a:pPr marL="0" indent="0">
               <a:buNone/>
             </a:pPr>
-            <a:endParaRPr lang="en-GB" sz="3200" dirty="0"/>
+            <a:r>
+              <a:rPr lang="en-GB" sz="3200" dirty="0"/>
+              <a:t>Windows </a:t>
+            </a:r>
+            <a:r>
+              <a:rPr lang="en-GB" sz="3200" dirty="0" err="1"/>
+              <a:t>Datacenter</a:t>
+            </a:r>
+            <a:r>
+              <a:rPr lang="en-GB" sz="3200" dirty="0"/>
+              <a:t> with Containers</a:t>
+            </a:r>
+          </a:p>
+          <a:p>
+            <a:pPr marL="0" indent="0">
+              <a:buNone/>
+            </a:pPr>
+            <a:r>
+              <a:rPr lang="en-GB" dirty="0"/>
+              <a:t>	Docker pre-installed</a:t>
+            </a:r>
+          </a:p>
+          <a:p>
+            <a:pPr marL="0" indent="0">
+              <a:buNone/>
+            </a:pPr>
+            <a:r>
+              <a:rPr lang="en-GB" dirty="0"/>
+              <a:t>	Images available (server core &amp; </a:t>
+            </a:r>
+            <a:r>
+              <a:rPr lang="en-GB" dirty="0" err="1"/>
+              <a:t>nano</a:t>
+            </a:r>
+            <a:r>
+              <a:rPr lang="en-GB" dirty="0"/>
+              <a:t> server)</a:t>
+            </a:r>
           </a:p>
         </p:txBody>
       </p:sp>
     </p:spTree>
     <p:extLst>
       <p:ext uri="{BB962C8B-B14F-4D97-AF65-F5344CB8AC3E}">
-        <p14:creationId xmlns:p14="http://schemas.microsoft.com/office/powerpoint/2010/main" val="4113174784"/>
+        <p14:creationId xmlns:p14="http://schemas.microsoft.com/office/powerpoint/2010/main" val="1081040829"/>
       </p:ext>
     </p:extLst>
   </p:cSld>
@@ -3586,7 +3630,7 @@
     </p:spTree>
     <p:extLst>
       <p:ext uri="{BB962C8B-B14F-4D97-AF65-F5344CB8AC3E}">
-        <p14:creationId xmlns:p14="http://schemas.microsoft.com/office/powerpoint/2010/main" val="4034876219"/>
+        <p14:creationId xmlns:p14="http://schemas.microsoft.com/office/powerpoint/2010/main" val="3428425072"/>
       </p:ext>
     </p:extLst>
   </p:cSld>
@@ -3636,8 +3680,21 @@
                   <a:schemeClr val="accent1"/>
                 </a:solidFill>
               </a:rPr>
-              <a:t>Azure Container Registry</a:t>
-            </a:r>
+              <a:t>Docker EE for </a:t>
+            </a:r>
+            <a:r>
+              <a:rPr lang="en-GB" dirty="0" err="1">
+                <a:solidFill>
+                  <a:schemeClr val="accent1"/>
+                </a:solidFill>
+              </a:rPr>
+              <a:t>Azuzre</a:t>
+            </a:r>
+            <a:endParaRPr lang="en-GB" dirty="0">
+              <a:solidFill>
+                <a:schemeClr val="accent1"/>
+              </a:solidFill>
+            </a:endParaRPr>
           </a:p>
         </p:txBody>
       </p:sp>
@@ -3663,7 +3720,7 @@
     </p:spTree>
     <p:extLst>
       <p:ext uri="{BB962C8B-B14F-4D97-AF65-F5344CB8AC3E}">
-        <p14:creationId xmlns:p14="http://schemas.microsoft.com/office/powerpoint/2010/main" val="878579766"/>
+        <p14:creationId xmlns:p14="http://schemas.microsoft.com/office/powerpoint/2010/main" val="3610026559"/>
       </p:ext>
     </p:extLst>
   </p:cSld>
@@ -3720,7 +3777,7 @@
                   </a:schemeClr>
                 </a:solidFill>
               </a:rPr>
-              <a:t>Header</a:t>
+              <a:t>Docker EE for Azure</a:t>
             </a:r>
           </a:p>
         </p:txBody>
@@ -3745,6 +3802,18 @@
             <a:pPr marL="0" indent="0">
               <a:buNone/>
             </a:pPr>
+            <a:r>
+              <a:rPr lang="en-GB" sz="3200" dirty="0">
+                <a:hlinkClick r:id="rId2"/>
+              </a:rPr>
+              <a:t>https://store.docker.com/editions/enterprise/docker-ee-azure</a:t>
+            </a:r>
+            <a:endParaRPr lang="en-GB" sz="3200" dirty="0"/>
+          </a:p>
+          <a:p>
+            <a:pPr marL="0" indent="0">
+              <a:buNone/>
+            </a:pPr>
             <a:endParaRPr lang="en-GB" sz="3200" dirty="0"/>
           </a:p>
         </p:txBody>
@@ -3752,7 +3821,7 @@
     </p:spTree>
     <p:extLst>
       <p:ext uri="{BB962C8B-B14F-4D97-AF65-F5344CB8AC3E}">
-        <p14:creationId xmlns:p14="http://schemas.microsoft.com/office/powerpoint/2010/main" val="2781743654"/>
+        <p14:creationId xmlns:p14="http://schemas.microsoft.com/office/powerpoint/2010/main" val="4113174784"/>
       </p:ext>
     </p:extLst>
   </p:cSld>
@@ -3829,7 +3898,7 @@
     </p:spTree>
     <p:extLst>
       <p:ext uri="{BB962C8B-B14F-4D97-AF65-F5344CB8AC3E}">
-        <p14:creationId xmlns:p14="http://schemas.microsoft.com/office/powerpoint/2010/main" val="2593481242"/>
+        <p14:creationId xmlns:p14="http://schemas.microsoft.com/office/powerpoint/2010/main" val="4034876219"/>
       </p:ext>
     </p:extLst>
   </p:cSld>
@@ -3879,7 +3948,7 @@
                   <a:schemeClr val="accent1"/>
                 </a:solidFill>
               </a:rPr>
-              <a:t>Azure Container Instances</a:t>
+              <a:t>Azure Container Registry</a:t>
             </a:r>
           </a:p>
         </p:txBody>
@@ -3906,7 +3975,7 @@
     </p:spTree>
     <p:extLst>
       <p:ext uri="{BB962C8B-B14F-4D97-AF65-F5344CB8AC3E}">
-        <p14:creationId xmlns:p14="http://schemas.microsoft.com/office/powerpoint/2010/main" val="3077493872"/>
+        <p14:creationId xmlns:p14="http://schemas.microsoft.com/office/powerpoint/2010/main" val="878579766"/>
       </p:ext>
     </p:extLst>
   </p:cSld>
@@ -3963,7 +4032,7 @@
                   </a:schemeClr>
                 </a:solidFill>
               </a:rPr>
-              <a:t>Header</a:t>
+              <a:t>Azure Container Registry</a:t>
             </a:r>
           </a:p>
         </p:txBody>
@@ -3988,14 +4057,53 @@
             <a:pPr marL="0" indent="0">
               <a:buNone/>
             </a:pPr>
-            <a:endParaRPr lang="en-GB" sz="3200" dirty="0"/>
+            <a:r>
+              <a:rPr lang="en-GB" sz="3200" dirty="0"/>
+              <a:t>Managed Docker registry service</a:t>
+            </a:r>
+          </a:p>
+          <a:p>
+            <a:pPr marL="0" indent="0">
+              <a:buNone/>
+            </a:pPr>
+            <a:r>
+              <a:rPr lang="en-GB" sz="3200" dirty="0"/>
+              <a:t>Stores private docker images</a:t>
+            </a:r>
+          </a:p>
+          <a:p>
+            <a:pPr marL="0" indent="0">
+              <a:buNone/>
+            </a:pPr>
+            <a:r>
+              <a:rPr lang="en-GB" sz="3200" dirty="0"/>
+              <a:t>Images can be pulled to </a:t>
+            </a:r>
+          </a:p>
+          <a:p>
+            <a:pPr marL="0" indent="0">
+              <a:buNone/>
+            </a:pPr>
+            <a:r>
+              <a:rPr lang="en-GB" dirty="0"/>
+              <a:t>	Other Azure Services</a:t>
+            </a:r>
+          </a:p>
+          <a:p>
+            <a:pPr marL="0" indent="0">
+              <a:buNone/>
+            </a:pPr>
+            <a:r>
+              <a:rPr lang="en-GB" dirty="0"/>
+              <a:t>	Orchestrators</a:t>
+            </a:r>
           </a:p>
         </p:txBody>
       </p:sp>
     </p:spTree>
     <p:extLst>
       <p:ext uri="{BB962C8B-B14F-4D97-AF65-F5344CB8AC3E}">
-        <p14:creationId xmlns:p14="http://schemas.microsoft.com/office/powerpoint/2010/main" val="2590341702"/>
+        <p14:creationId xmlns:p14="http://schemas.microsoft.com/office/powerpoint/2010/main" val="2781743654"/>
       </p:ext>
     </p:extLst>
   </p:cSld>
@@ -4024,7 +4132,7 @@
       </p:grpSpPr>
       <p:sp>
         <p:nvSpPr>
-          <p:cNvPr id="4" name="Title 3"/>
+          <p:cNvPr id="6" name="Title 5"/>
           <p:cNvSpPr>
             <a:spLocks noGrp="1"/>
           </p:cNvSpPr>
@@ -4032,7 +4140,12 @@
             <p:ph type="title"/>
           </p:nvPr>
         </p:nvSpPr>
-        <p:spPr/>
+        <p:spPr>
+          <a:xfrm>
+            <a:off x="331596" y="562708"/>
+            <a:ext cx="10184004" cy="713433"/>
+          </a:xfrm>
+        </p:spPr>
         <p:txBody>
           <a:bodyPr>
             <a:normAutofit/>
@@ -4042,37 +4155,106 @@
             <a:r>
               <a:rPr lang="en-GB" dirty="0">
                 <a:solidFill>
-                  <a:schemeClr val="accent1"/>
+                  <a:schemeClr val="accent1">
+                    <a:lumMod val="75000"/>
+                  </a:schemeClr>
                 </a:solidFill>
               </a:rPr>
-              <a:t>Demo</a:t>
-            </a:r>
-          </a:p>
-        </p:txBody>
-      </p:sp>
-      <p:sp>
-        <p:nvSpPr>
-          <p:cNvPr id="2" name="Text Placeholder 1"/>
-          <p:cNvSpPr>
-            <a:spLocks noGrp="1"/>
-          </p:cNvSpPr>
-          <p:nvPr>
-            <p:ph type="body" idx="1"/>
+              <a:t>Azure Container Registry</a:t>
+            </a:r>
+          </a:p>
+        </p:txBody>
+      </p:sp>
+      <p:sp>
+        <p:nvSpPr>
+          <p:cNvPr id="3" name="Subtitle 2"/>
+          <p:cNvSpPr>
+            <a:spLocks noGrp="1"/>
+          </p:cNvSpPr>
+          <p:nvPr>
+            <p:ph idx="1"/>
           </p:nvPr>
         </p:nvSpPr>
         <p:spPr/>
         <p:txBody>
-          <a:bodyPr/>
-          <a:lstStyle/>
-          <a:p>
-            <a:endParaRPr lang="en-GB" dirty="0"/>
+          <a:bodyPr>
+            <a:normAutofit/>
+          </a:bodyPr>
+          <a:lstStyle/>
+          <a:p>
+            <a:pPr marL="0" indent="0">
+              <a:buNone/>
+            </a:pPr>
+            <a:r>
+              <a:rPr lang="en-GB" sz="3200" dirty="0"/>
+              <a:t>Registry</a:t>
+            </a:r>
+          </a:p>
+          <a:p>
+            <a:pPr marL="0" indent="0">
+              <a:buNone/>
+            </a:pPr>
+            <a:r>
+              <a:rPr lang="en-GB" dirty="0"/>
+              <a:t>	Storage of images</a:t>
+            </a:r>
+          </a:p>
+          <a:p>
+            <a:pPr marL="0" indent="0">
+              <a:buNone/>
+            </a:pPr>
+            <a:r>
+              <a:rPr lang="en-GB" sz="3200" dirty="0"/>
+              <a:t>Repository</a:t>
+            </a:r>
+          </a:p>
+          <a:p>
+            <a:pPr marL="0" indent="0">
+              <a:buNone/>
+            </a:pPr>
+            <a:r>
+              <a:rPr lang="en-GB" sz="3200" dirty="0"/>
+              <a:t>	</a:t>
+            </a:r>
+            <a:r>
+              <a:rPr lang="en-GB" dirty="0"/>
+              <a:t>Groups of container images</a:t>
+            </a:r>
+            <a:endParaRPr lang="en-GB" sz="3200" dirty="0"/>
+          </a:p>
+          <a:p>
+            <a:pPr marL="0" indent="0">
+              <a:buNone/>
+            </a:pPr>
+            <a:r>
+              <a:rPr lang="en-GB" sz="3200" dirty="0"/>
+              <a:t>Image</a:t>
+            </a:r>
+          </a:p>
+          <a:p>
+            <a:pPr marL="0" indent="0">
+              <a:buNone/>
+            </a:pPr>
+            <a:r>
+              <a:rPr lang="en-GB" dirty="0"/>
+              <a:t>	Read only snapshot of a container</a:t>
+            </a:r>
+          </a:p>
+          <a:p>
+            <a:pPr marL="0" indent="0">
+              <a:buNone/>
+            </a:pPr>
+            <a:r>
+              <a:rPr lang="en-GB" sz="3200" dirty="0"/>
+              <a:t>	</a:t>
+            </a:r>
           </a:p>
         </p:txBody>
       </p:sp>
     </p:spTree>
     <p:extLst>
       <p:ext uri="{BB962C8B-B14F-4D97-AF65-F5344CB8AC3E}">
-        <p14:creationId xmlns:p14="http://schemas.microsoft.com/office/powerpoint/2010/main" val="2367277479"/>
+        <p14:creationId xmlns:p14="http://schemas.microsoft.com/office/powerpoint/2010/main" val="1215426168"/>
       </p:ext>
     </p:extLst>
   </p:cSld>
@@ -4122,7 +4304,7 @@
                   <a:schemeClr val="accent1"/>
                 </a:solidFill>
               </a:rPr>
-              <a:t>Azure Container Services</a:t>
+              <a:t>Demo</a:t>
             </a:r>
           </a:p>
         </p:txBody>
@@ -4149,7 +4331,7 @@
     </p:spTree>
     <p:extLst>
       <p:ext uri="{BB962C8B-B14F-4D97-AF65-F5344CB8AC3E}">
-        <p14:creationId xmlns:p14="http://schemas.microsoft.com/office/powerpoint/2010/main" val="1710832568"/>
+        <p14:creationId xmlns:p14="http://schemas.microsoft.com/office/powerpoint/2010/main" val="2593481242"/>
       </p:ext>
     </p:extLst>
   </p:cSld>
@@ -4178,7 +4360,7 @@
       </p:grpSpPr>
       <p:sp>
         <p:nvSpPr>
-          <p:cNvPr id="6" name="Title 5"/>
+          <p:cNvPr id="4" name="Title 3"/>
           <p:cNvSpPr>
             <a:spLocks noGrp="1"/>
           </p:cNvSpPr>
@@ -4186,12 +4368,7 @@
             <p:ph type="title"/>
           </p:nvPr>
         </p:nvSpPr>
-        <p:spPr>
-          <a:xfrm>
-            <a:off x="331596" y="562708"/>
-            <a:ext cx="10184004" cy="713433"/>
-          </a:xfrm>
-        </p:spPr>
+        <p:spPr/>
         <p:txBody>
           <a:bodyPr>
             <a:normAutofit/>
@@ -4201,44 +4378,37 @@
             <a:r>
               <a:rPr lang="en-GB" dirty="0">
                 <a:solidFill>
-                  <a:schemeClr val="accent1">
-                    <a:lumMod val="75000"/>
-                  </a:schemeClr>
+                  <a:schemeClr val="accent1"/>
                 </a:solidFill>
               </a:rPr>
-              <a:t>Header</a:t>
-            </a:r>
-          </a:p>
-        </p:txBody>
-      </p:sp>
-      <p:sp>
-        <p:nvSpPr>
-          <p:cNvPr id="3" name="Subtitle 2"/>
-          <p:cNvSpPr>
-            <a:spLocks noGrp="1"/>
-          </p:cNvSpPr>
-          <p:nvPr>
-            <p:ph idx="1"/>
+              <a:t>Azure Container Instances</a:t>
+            </a:r>
+          </a:p>
+        </p:txBody>
+      </p:sp>
+      <p:sp>
+        <p:nvSpPr>
+          <p:cNvPr id="2" name="Text Placeholder 1"/>
+          <p:cNvSpPr>
+            <a:spLocks noGrp="1"/>
+          </p:cNvSpPr>
+          <p:nvPr>
+            <p:ph type="body" idx="1"/>
           </p:nvPr>
         </p:nvSpPr>
         <p:spPr/>
         <p:txBody>
-          <a:bodyPr>
-            <a:normAutofit/>
-          </a:bodyPr>
-          <a:lstStyle/>
-          <a:p>
-            <a:pPr marL="0" indent="0">
-              <a:buNone/>
-            </a:pPr>
-            <a:endParaRPr lang="en-GB" sz="3200" dirty="0"/>
+          <a:bodyPr/>
+          <a:lstStyle/>
+          <a:p>
+            <a:endParaRPr lang="en-GB" dirty="0"/>
           </a:p>
         </p:txBody>
       </p:sp>
     </p:spTree>
     <p:extLst>
       <p:ext uri="{BB962C8B-B14F-4D97-AF65-F5344CB8AC3E}">
-        <p14:creationId xmlns:p14="http://schemas.microsoft.com/office/powerpoint/2010/main" val="1834450055"/>
+        <p14:creationId xmlns:p14="http://schemas.microsoft.com/office/powerpoint/2010/main" val="3077493872"/>
       </p:ext>
     </p:extLst>
   </p:cSld>
@@ -4452,7 +4622,7 @@
       </p:grpSpPr>
       <p:sp>
         <p:nvSpPr>
-          <p:cNvPr id="4" name="Title 3"/>
+          <p:cNvPr id="6" name="Title 5"/>
           <p:cNvSpPr>
             <a:spLocks noGrp="1"/>
           </p:cNvSpPr>
@@ -4460,7 +4630,12 @@
             <p:ph type="title"/>
           </p:nvPr>
         </p:nvSpPr>
-        <p:spPr/>
+        <p:spPr>
+          <a:xfrm>
+            <a:off x="331596" y="562708"/>
+            <a:ext cx="10184004" cy="713433"/>
+          </a:xfrm>
+        </p:spPr>
         <p:txBody>
           <a:bodyPr>
             <a:normAutofit/>
@@ -4470,37 +4645,97 @@
             <a:r>
               <a:rPr lang="en-GB" dirty="0">
                 <a:solidFill>
-                  <a:schemeClr val="accent1"/>
+                  <a:schemeClr val="accent1">
+                    <a:lumMod val="75000"/>
+                  </a:schemeClr>
                 </a:solidFill>
               </a:rPr>
-              <a:t>Demo</a:t>
-            </a:r>
-          </a:p>
-        </p:txBody>
-      </p:sp>
-      <p:sp>
-        <p:nvSpPr>
-          <p:cNvPr id="2" name="Text Placeholder 1"/>
-          <p:cNvSpPr>
-            <a:spLocks noGrp="1"/>
-          </p:cNvSpPr>
-          <p:nvPr>
-            <p:ph type="body" idx="1"/>
+              <a:t>Azure Container Instances</a:t>
+            </a:r>
+          </a:p>
+        </p:txBody>
+      </p:sp>
+      <p:sp>
+        <p:nvSpPr>
+          <p:cNvPr id="3" name="Subtitle 2"/>
+          <p:cNvSpPr>
+            <a:spLocks noGrp="1"/>
+          </p:cNvSpPr>
+          <p:nvPr>
+            <p:ph idx="1"/>
           </p:nvPr>
         </p:nvSpPr>
         <p:spPr/>
         <p:txBody>
-          <a:bodyPr/>
-          <a:lstStyle/>
-          <a:p>
-            <a:endParaRPr lang="en-GB" dirty="0"/>
+          <a:bodyPr>
+            <a:normAutofit/>
+          </a:bodyPr>
+          <a:lstStyle/>
+          <a:p>
+            <a:pPr marL="0" indent="0">
+              <a:buNone/>
+            </a:pPr>
+            <a:r>
+              <a:rPr lang="en-GB" sz="3200" dirty="0"/>
+              <a:t>Running containers without servers</a:t>
+            </a:r>
+          </a:p>
+          <a:p>
+            <a:pPr marL="0" indent="0">
+              <a:buNone/>
+            </a:pPr>
+            <a:r>
+              <a:rPr lang="en-GB" sz="3200" dirty="0"/>
+              <a:t>No need to manage VMs</a:t>
+            </a:r>
+          </a:p>
+          <a:p>
+            <a:pPr marL="0" indent="0">
+              <a:buNone/>
+            </a:pPr>
+            <a:r>
+              <a:rPr lang="en-GB" sz="3200" dirty="0"/>
+              <a:t>Spin up in seconds</a:t>
+            </a:r>
+          </a:p>
+          <a:p>
+            <a:pPr marL="0" indent="0">
+              <a:buNone/>
+            </a:pPr>
+            <a:r>
+              <a:rPr lang="en-GB" sz="3200" dirty="0"/>
+              <a:t>Deployed via the CLI, </a:t>
+            </a:r>
+            <a:r>
+              <a:rPr lang="en-GB" sz="3200" dirty="0" err="1"/>
+              <a:t>powershell</a:t>
+            </a:r>
+            <a:r>
+              <a:rPr lang="en-GB" sz="3200" dirty="0"/>
+              <a:t>, or Azure Portal</a:t>
+            </a:r>
+          </a:p>
+          <a:p>
+            <a:pPr marL="0" indent="0">
+              <a:buNone/>
+            </a:pPr>
+            <a:r>
+              <a:rPr lang="en-GB" sz="3200" dirty="0"/>
+              <a:t>Billed by the second</a:t>
+            </a:r>
+          </a:p>
+          <a:p>
+            <a:pPr marL="0" indent="0">
+              <a:buNone/>
+            </a:pPr>
+            <a:endParaRPr lang="en-GB" sz="3200" dirty="0"/>
           </a:p>
         </p:txBody>
       </p:sp>
     </p:spTree>
     <p:extLst>
       <p:ext uri="{BB962C8B-B14F-4D97-AF65-F5344CB8AC3E}">
-        <p14:creationId xmlns:p14="http://schemas.microsoft.com/office/powerpoint/2010/main" val="2917938358"/>
+        <p14:creationId xmlns:p14="http://schemas.microsoft.com/office/powerpoint/2010/main" val="2590341702"/>
       </p:ext>
     </p:extLst>
   </p:cSld>
@@ -4529,6 +4764,804 @@
       </p:grpSpPr>
       <p:sp>
         <p:nvSpPr>
+          <p:cNvPr id="6" name="Title 5"/>
+          <p:cNvSpPr>
+            <a:spLocks noGrp="1"/>
+          </p:cNvSpPr>
+          <p:nvPr>
+            <p:ph type="title"/>
+          </p:nvPr>
+        </p:nvSpPr>
+        <p:spPr>
+          <a:xfrm>
+            <a:off x="331596" y="562708"/>
+            <a:ext cx="10184004" cy="713433"/>
+          </a:xfrm>
+        </p:spPr>
+        <p:txBody>
+          <a:bodyPr>
+            <a:normAutofit/>
+          </a:bodyPr>
+          <a:lstStyle/>
+          <a:p>
+            <a:r>
+              <a:rPr lang="en-GB" dirty="0">
+                <a:solidFill>
+                  <a:schemeClr val="accent1">
+                    <a:lumMod val="75000"/>
+                  </a:schemeClr>
+                </a:solidFill>
+              </a:rPr>
+              <a:t>ACI - Options</a:t>
+            </a:r>
+          </a:p>
+        </p:txBody>
+      </p:sp>
+      <p:sp>
+        <p:nvSpPr>
+          <p:cNvPr id="3" name="Subtitle 2"/>
+          <p:cNvSpPr>
+            <a:spLocks noGrp="1"/>
+          </p:cNvSpPr>
+          <p:nvPr>
+            <p:ph idx="1"/>
+          </p:nvPr>
+        </p:nvSpPr>
+        <p:spPr/>
+        <p:txBody>
+          <a:bodyPr>
+            <a:normAutofit/>
+          </a:bodyPr>
+          <a:lstStyle/>
+          <a:p>
+            <a:pPr marL="0" indent="0">
+              <a:buNone/>
+            </a:pPr>
+            <a:r>
+              <a:rPr lang="en-GB" sz="3200" dirty="0"/>
+              <a:t>Linux &amp; Windows containers</a:t>
+            </a:r>
+          </a:p>
+          <a:p>
+            <a:pPr marL="0" indent="0">
+              <a:buNone/>
+            </a:pPr>
+            <a:r>
+              <a:rPr lang="en-GB" sz="3200" dirty="0"/>
+              <a:t>Containers exposed directly to the internet</a:t>
+            </a:r>
+          </a:p>
+          <a:p>
+            <a:pPr marL="0" indent="0">
+              <a:buNone/>
+            </a:pPr>
+            <a:r>
+              <a:rPr lang="en-GB" sz="3200" dirty="0"/>
+              <a:t>	</a:t>
+            </a:r>
+            <a:r>
+              <a:rPr lang="en-GB" dirty="0"/>
+              <a:t>IP Address and FQDN</a:t>
+            </a:r>
+          </a:p>
+          <a:p>
+            <a:pPr marL="0" indent="0">
+              <a:buNone/>
+            </a:pPr>
+            <a:r>
+              <a:rPr lang="en-GB" sz="3200" dirty="0"/>
+              <a:t>Hypervisor level isolation</a:t>
+            </a:r>
+          </a:p>
+          <a:p>
+            <a:pPr marL="0" indent="0">
+              <a:buNone/>
+            </a:pPr>
+            <a:r>
+              <a:rPr lang="en-GB" sz="3200" dirty="0"/>
+              <a:t>Persistent storage</a:t>
+            </a:r>
+          </a:p>
+          <a:p>
+            <a:pPr marL="0" indent="0">
+              <a:buNone/>
+            </a:pPr>
+            <a:r>
+              <a:rPr lang="en-GB" sz="3200" dirty="0"/>
+              <a:t>	</a:t>
+            </a:r>
+            <a:r>
+              <a:rPr lang="en-GB" dirty="0"/>
+              <a:t>Azure files shares</a:t>
+            </a:r>
+          </a:p>
+          <a:p>
+            <a:pPr marL="0" indent="0">
+              <a:buNone/>
+            </a:pPr>
+            <a:r>
+              <a:rPr lang="en-GB" sz="3200" dirty="0"/>
+              <a:t>Container Groups</a:t>
+            </a:r>
+          </a:p>
+          <a:p>
+            <a:pPr marL="0" indent="0">
+              <a:buNone/>
+            </a:pPr>
+            <a:endParaRPr lang="en-GB" sz="3200" dirty="0"/>
+          </a:p>
+        </p:txBody>
+      </p:sp>
+    </p:spTree>
+    <p:extLst>
+      <p:ext uri="{BB962C8B-B14F-4D97-AF65-F5344CB8AC3E}">
+        <p14:creationId xmlns:p14="http://schemas.microsoft.com/office/powerpoint/2010/main" val="334400448"/>
+      </p:ext>
+    </p:extLst>
+  </p:cSld>
+  <p:clrMapOvr>
+    <a:masterClrMapping/>
+  </p:clrMapOvr>
+</p:sld>
+</file>
+
+<file path=ppt/slides/slide22.xml><?xml version="1.0" encoding="utf-8"?>
+<p:sld xmlns:a="http://schemas.openxmlformats.org/drawingml/2006/main" xmlns:r="http://schemas.openxmlformats.org/officeDocument/2006/relationships" xmlns:p="http://schemas.openxmlformats.org/presentationml/2006/main">
+  <p:cSld>
+    <p:spTree>
+      <p:nvGrpSpPr>
+        <p:cNvPr id="1" name=""/>
+        <p:cNvGrpSpPr/>
+        <p:nvPr/>
+      </p:nvGrpSpPr>
+      <p:grpSpPr>
+        <a:xfrm>
+          <a:off x="0" y="0"/>
+          <a:ext cx="0" cy="0"/>
+          <a:chOff x="0" y="0"/>
+          <a:chExt cx="0" cy="0"/>
+        </a:xfrm>
+      </p:grpSpPr>
+      <p:sp>
+        <p:nvSpPr>
+          <p:cNvPr id="4" name="Title 3"/>
+          <p:cNvSpPr>
+            <a:spLocks noGrp="1"/>
+          </p:cNvSpPr>
+          <p:nvPr>
+            <p:ph type="title"/>
+          </p:nvPr>
+        </p:nvSpPr>
+        <p:spPr/>
+        <p:txBody>
+          <a:bodyPr>
+            <a:normAutofit/>
+          </a:bodyPr>
+          <a:lstStyle/>
+          <a:p>
+            <a:r>
+              <a:rPr lang="en-GB" dirty="0">
+                <a:solidFill>
+                  <a:schemeClr val="accent1"/>
+                </a:solidFill>
+              </a:rPr>
+              <a:t>Demo</a:t>
+            </a:r>
+          </a:p>
+        </p:txBody>
+      </p:sp>
+      <p:sp>
+        <p:nvSpPr>
+          <p:cNvPr id="2" name="Text Placeholder 1"/>
+          <p:cNvSpPr>
+            <a:spLocks noGrp="1"/>
+          </p:cNvSpPr>
+          <p:nvPr>
+            <p:ph type="body" idx="1"/>
+          </p:nvPr>
+        </p:nvSpPr>
+        <p:spPr/>
+        <p:txBody>
+          <a:bodyPr/>
+          <a:lstStyle/>
+          <a:p>
+            <a:endParaRPr lang="en-GB" dirty="0"/>
+          </a:p>
+        </p:txBody>
+      </p:sp>
+    </p:spTree>
+    <p:extLst>
+      <p:ext uri="{BB962C8B-B14F-4D97-AF65-F5344CB8AC3E}">
+        <p14:creationId xmlns:p14="http://schemas.microsoft.com/office/powerpoint/2010/main" val="2367277479"/>
+      </p:ext>
+    </p:extLst>
+  </p:cSld>
+  <p:clrMapOvr>
+    <a:masterClrMapping/>
+  </p:clrMapOvr>
+</p:sld>
+</file>
+
+<file path=ppt/slides/slide23.xml><?xml version="1.0" encoding="utf-8"?>
+<p:sld xmlns:a="http://schemas.openxmlformats.org/drawingml/2006/main" xmlns:r="http://schemas.openxmlformats.org/officeDocument/2006/relationships" xmlns:p="http://schemas.openxmlformats.org/presentationml/2006/main">
+  <p:cSld>
+    <p:spTree>
+      <p:nvGrpSpPr>
+        <p:cNvPr id="1" name=""/>
+        <p:cNvGrpSpPr/>
+        <p:nvPr/>
+      </p:nvGrpSpPr>
+      <p:grpSpPr>
+        <a:xfrm>
+          <a:off x="0" y="0"/>
+          <a:ext cx="0" cy="0"/>
+          <a:chOff x="0" y="0"/>
+          <a:chExt cx="0" cy="0"/>
+        </a:xfrm>
+      </p:grpSpPr>
+      <p:sp>
+        <p:nvSpPr>
+          <p:cNvPr id="4" name="Title 3"/>
+          <p:cNvSpPr>
+            <a:spLocks noGrp="1"/>
+          </p:cNvSpPr>
+          <p:nvPr>
+            <p:ph type="title"/>
+          </p:nvPr>
+        </p:nvSpPr>
+        <p:spPr/>
+        <p:txBody>
+          <a:bodyPr>
+            <a:normAutofit/>
+          </a:bodyPr>
+          <a:lstStyle/>
+          <a:p>
+            <a:r>
+              <a:rPr lang="en-GB" dirty="0">
+                <a:solidFill>
+                  <a:schemeClr val="accent1"/>
+                </a:solidFill>
+              </a:rPr>
+              <a:t>Azure Container Services</a:t>
+            </a:r>
+          </a:p>
+        </p:txBody>
+      </p:sp>
+      <p:sp>
+        <p:nvSpPr>
+          <p:cNvPr id="2" name="Text Placeholder 1"/>
+          <p:cNvSpPr>
+            <a:spLocks noGrp="1"/>
+          </p:cNvSpPr>
+          <p:nvPr>
+            <p:ph type="body" idx="1"/>
+          </p:nvPr>
+        </p:nvSpPr>
+        <p:spPr/>
+        <p:txBody>
+          <a:bodyPr/>
+          <a:lstStyle/>
+          <a:p>
+            <a:endParaRPr lang="en-GB" dirty="0"/>
+          </a:p>
+        </p:txBody>
+      </p:sp>
+    </p:spTree>
+    <p:extLst>
+      <p:ext uri="{BB962C8B-B14F-4D97-AF65-F5344CB8AC3E}">
+        <p14:creationId xmlns:p14="http://schemas.microsoft.com/office/powerpoint/2010/main" val="1710832568"/>
+      </p:ext>
+    </p:extLst>
+  </p:cSld>
+  <p:clrMapOvr>
+    <a:masterClrMapping/>
+  </p:clrMapOvr>
+</p:sld>
+</file>
+
+<file path=ppt/slides/slide24.xml><?xml version="1.0" encoding="utf-8"?>
+<p:sld xmlns:a="http://schemas.openxmlformats.org/drawingml/2006/main" xmlns:r="http://schemas.openxmlformats.org/officeDocument/2006/relationships" xmlns:p="http://schemas.openxmlformats.org/presentationml/2006/main">
+  <p:cSld>
+    <p:spTree>
+      <p:nvGrpSpPr>
+        <p:cNvPr id="1" name=""/>
+        <p:cNvGrpSpPr/>
+        <p:nvPr/>
+      </p:nvGrpSpPr>
+      <p:grpSpPr>
+        <a:xfrm>
+          <a:off x="0" y="0"/>
+          <a:ext cx="0" cy="0"/>
+          <a:chOff x="0" y="0"/>
+          <a:chExt cx="0" cy="0"/>
+        </a:xfrm>
+      </p:grpSpPr>
+      <p:sp>
+        <p:nvSpPr>
+          <p:cNvPr id="6" name="Title 5"/>
+          <p:cNvSpPr>
+            <a:spLocks noGrp="1"/>
+          </p:cNvSpPr>
+          <p:nvPr>
+            <p:ph type="title"/>
+          </p:nvPr>
+        </p:nvSpPr>
+        <p:spPr>
+          <a:xfrm>
+            <a:off x="331596" y="562708"/>
+            <a:ext cx="10184004" cy="713433"/>
+          </a:xfrm>
+        </p:spPr>
+        <p:txBody>
+          <a:bodyPr>
+            <a:normAutofit/>
+          </a:bodyPr>
+          <a:lstStyle/>
+          <a:p>
+            <a:r>
+              <a:rPr lang="en-GB" dirty="0">
+                <a:solidFill>
+                  <a:schemeClr val="accent1">
+                    <a:lumMod val="75000"/>
+                  </a:schemeClr>
+                </a:solidFill>
+              </a:rPr>
+              <a:t>Azure Container Services</a:t>
+            </a:r>
+          </a:p>
+        </p:txBody>
+      </p:sp>
+      <p:sp>
+        <p:nvSpPr>
+          <p:cNvPr id="3" name="Subtitle 2"/>
+          <p:cNvSpPr>
+            <a:spLocks noGrp="1"/>
+          </p:cNvSpPr>
+          <p:nvPr>
+            <p:ph idx="1"/>
+          </p:nvPr>
+        </p:nvSpPr>
+        <p:spPr/>
+        <p:txBody>
+          <a:bodyPr>
+            <a:normAutofit/>
+          </a:bodyPr>
+          <a:lstStyle/>
+          <a:p>
+            <a:pPr marL="0" indent="0">
+              <a:buNone/>
+            </a:pPr>
+            <a:r>
+              <a:rPr lang="en-GB" sz="3200" dirty="0"/>
+              <a:t>Two flavours</a:t>
+            </a:r>
+          </a:p>
+          <a:p>
+            <a:pPr marL="0" indent="0">
+              <a:buNone/>
+            </a:pPr>
+            <a:r>
+              <a:rPr lang="en-GB" sz="3200" dirty="0"/>
+              <a:t>	Azure Container Services (ACS)</a:t>
+            </a:r>
+          </a:p>
+          <a:p>
+            <a:pPr marL="0" indent="0">
+              <a:buNone/>
+            </a:pPr>
+            <a:r>
+              <a:rPr lang="en-GB" sz="3200" dirty="0"/>
+              <a:t>	Azure Container Service (AKS)</a:t>
+            </a:r>
+          </a:p>
+          <a:p>
+            <a:pPr marL="0" indent="0">
+              <a:buNone/>
+            </a:pPr>
+            <a:endParaRPr lang="en-GB" sz="3200" dirty="0"/>
+          </a:p>
+          <a:p>
+            <a:pPr marL="0" indent="0">
+              <a:buNone/>
+            </a:pPr>
+            <a:r>
+              <a:rPr lang="en-GB" sz="3200" dirty="0"/>
+              <a:t>ACS provides container hosting using DC/OS, Swarm, or K8s</a:t>
+            </a:r>
+          </a:p>
+          <a:p>
+            <a:pPr marL="0" indent="0">
+              <a:buNone/>
+            </a:pPr>
+            <a:r>
+              <a:rPr lang="en-GB" sz="3200" dirty="0"/>
+              <a:t>AKS is specifically built to implement Kubernetes</a:t>
+            </a:r>
+          </a:p>
+        </p:txBody>
+      </p:sp>
+    </p:spTree>
+    <p:extLst>
+      <p:ext uri="{BB962C8B-B14F-4D97-AF65-F5344CB8AC3E}">
+        <p14:creationId xmlns:p14="http://schemas.microsoft.com/office/powerpoint/2010/main" val="3974016028"/>
+      </p:ext>
+    </p:extLst>
+  </p:cSld>
+  <p:clrMapOvr>
+    <a:masterClrMapping/>
+  </p:clrMapOvr>
+</p:sld>
+</file>
+
+<file path=ppt/slides/slide25.xml><?xml version="1.0" encoding="utf-8"?>
+<p:sld xmlns:a="http://schemas.openxmlformats.org/drawingml/2006/main" xmlns:r="http://schemas.openxmlformats.org/officeDocument/2006/relationships" xmlns:p="http://schemas.openxmlformats.org/presentationml/2006/main">
+  <p:cSld>
+    <p:spTree>
+      <p:nvGrpSpPr>
+        <p:cNvPr id="1" name=""/>
+        <p:cNvGrpSpPr/>
+        <p:nvPr/>
+      </p:nvGrpSpPr>
+      <p:grpSpPr>
+        <a:xfrm>
+          <a:off x="0" y="0"/>
+          <a:ext cx="0" cy="0"/>
+          <a:chOff x="0" y="0"/>
+          <a:chExt cx="0" cy="0"/>
+        </a:xfrm>
+      </p:grpSpPr>
+      <p:sp>
+        <p:nvSpPr>
+          <p:cNvPr id="6" name="Title 5"/>
+          <p:cNvSpPr>
+            <a:spLocks noGrp="1"/>
+          </p:cNvSpPr>
+          <p:nvPr>
+            <p:ph type="title"/>
+          </p:nvPr>
+        </p:nvSpPr>
+        <p:spPr>
+          <a:xfrm>
+            <a:off x="331596" y="562708"/>
+            <a:ext cx="10184004" cy="713433"/>
+          </a:xfrm>
+        </p:spPr>
+        <p:txBody>
+          <a:bodyPr>
+            <a:normAutofit/>
+          </a:bodyPr>
+          <a:lstStyle/>
+          <a:p>
+            <a:r>
+              <a:rPr lang="en-GB" dirty="0">
+                <a:solidFill>
+                  <a:schemeClr val="accent1">
+                    <a:lumMod val="75000"/>
+                  </a:schemeClr>
+                </a:solidFill>
+              </a:rPr>
+              <a:t>Kubernetes</a:t>
+            </a:r>
+          </a:p>
+        </p:txBody>
+      </p:sp>
+      <p:sp>
+        <p:nvSpPr>
+          <p:cNvPr id="3" name="Subtitle 2"/>
+          <p:cNvSpPr>
+            <a:spLocks noGrp="1"/>
+          </p:cNvSpPr>
+          <p:nvPr>
+            <p:ph idx="1"/>
+          </p:nvPr>
+        </p:nvSpPr>
+        <p:spPr/>
+        <p:txBody>
+          <a:bodyPr>
+            <a:normAutofit/>
+          </a:bodyPr>
+          <a:lstStyle/>
+          <a:p>
+            <a:pPr marL="0" indent="0">
+              <a:buNone/>
+            </a:pPr>
+            <a:r>
+              <a:rPr lang="en-GB" sz="3200" dirty="0"/>
+              <a:t>Open Source system for managing containers</a:t>
+            </a:r>
+          </a:p>
+          <a:p>
+            <a:pPr marL="0" indent="0">
+              <a:buNone/>
+            </a:pPr>
+            <a:r>
+              <a:rPr lang="en-GB" sz="3200" dirty="0"/>
+              <a:t>Deployed as a cluster containing a master and multiple nodes</a:t>
+            </a:r>
+          </a:p>
+          <a:p>
+            <a:pPr marL="0" indent="0">
+              <a:buNone/>
+            </a:pPr>
+            <a:r>
+              <a:rPr lang="en-GB" sz="3200" dirty="0"/>
+              <a:t>Pods hold containers running on the nodes</a:t>
+            </a:r>
+          </a:p>
+          <a:p>
+            <a:pPr marL="0" indent="0">
+              <a:buNone/>
+            </a:pPr>
+            <a:r>
+              <a:rPr lang="en-GB" sz="3200" dirty="0"/>
+              <a:t>Services define/allow access to sets of pods</a:t>
+            </a:r>
+          </a:p>
+          <a:p>
+            <a:pPr marL="0" indent="0">
+              <a:buNone/>
+            </a:pPr>
+            <a:r>
+              <a:rPr lang="en-GB" sz="3200" dirty="0"/>
+              <a:t>Deployments created and managed via </a:t>
+            </a:r>
+            <a:r>
+              <a:rPr lang="en-GB" sz="3200" dirty="0" err="1"/>
+              <a:t>Kubectl</a:t>
+            </a:r>
+            <a:endParaRPr lang="en-GB" sz="3200" dirty="0"/>
+          </a:p>
+        </p:txBody>
+      </p:sp>
+    </p:spTree>
+    <p:extLst>
+      <p:ext uri="{BB962C8B-B14F-4D97-AF65-F5344CB8AC3E}">
+        <p14:creationId xmlns:p14="http://schemas.microsoft.com/office/powerpoint/2010/main" val="1834450055"/>
+      </p:ext>
+    </p:extLst>
+  </p:cSld>
+  <p:clrMapOvr>
+    <a:masterClrMapping/>
+  </p:clrMapOvr>
+</p:sld>
+</file>
+
+<file path=ppt/slides/slide26.xml><?xml version="1.0" encoding="utf-8"?>
+<p:sld xmlns:a="http://schemas.openxmlformats.org/drawingml/2006/main" xmlns:r="http://schemas.openxmlformats.org/officeDocument/2006/relationships" xmlns:p="http://schemas.openxmlformats.org/presentationml/2006/main">
+  <p:cSld>
+    <p:spTree>
+      <p:nvGrpSpPr>
+        <p:cNvPr id="1" name=""/>
+        <p:cNvGrpSpPr/>
+        <p:nvPr/>
+      </p:nvGrpSpPr>
+      <p:grpSpPr>
+        <a:xfrm>
+          <a:off x="0" y="0"/>
+          <a:ext cx="0" cy="0"/>
+          <a:chOff x="0" y="0"/>
+          <a:chExt cx="0" cy="0"/>
+        </a:xfrm>
+      </p:grpSpPr>
+      <p:sp>
+        <p:nvSpPr>
+          <p:cNvPr id="6" name="Title 5"/>
+          <p:cNvSpPr>
+            <a:spLocks noGrp="1"/>
+          </p:cNvSpPr>
+          <p:nvPr>
+            <p:ph type="title"/>
+          </p:nvPr>
+        </p:nvSpPr>
+        <p:spPr>
+          <a:xfrm>
+            <a:off x="331596" y="562708"/>
+            <a:ext cx="10184004" cy="713433"/>
+          </a:xfrm>
+        </p:spPr>
+        <p:txBody>
+          <a:bodyPr>
+            <a:normAutofit/>
+          </a:bodyPr>
+          <a:lstStyle/>
+          <a:p>
+            <a:r>
+              <a:rPr lang="en-GB" dirty="0">
+                <a:solidFill>
+                  <a:schemeClr val="accent1">
+                    <a:lumMod val="75000"/>
+                  </a:schemeClr>
+                </a:solidFill>
+              </a:rPr>
+              <a:t>Azure Container Services (AKS)</a:t>
+            </a:r>
+          </a:p>
+        </p:txBody>
+      </p:sp>
+      <p:sp>
+        <p:nvSpPr>
+          <p:cNvPr id="3" name="Subtitle 2"/>
+          <p:cNvSpPr>
+            <a:spLocks noGrp="1"/>
+          </p:cNvSpPr>
+          <p:nvPr>
+            <p:ph idx="1"/>
+          </p:nvPr>
+        </p:nvSpPr>
+        <p:spPr/>
+        <p:txBody>
+          <a:bodyPr>
+            <a:normAutofit/>
+          </a:bodyPr>
+          <a:lstStyle/>
+          <a:p>
+            <a:pPr marL="0" indent="0">
+              <a:buNone/>
+            </a:pPr>
+            <a:r>
+              <a:rPr lang="en-GB" sz="3200" dirty="0"/>
+              <a:t>Simplifies deployment of Kubernetes clusters in Azure</a:t>
+            </a:r>
+          </a:p>
+          <a:p>
+            <a:pPr marL="0" indent="0">
+              <a:buNone/>
+            </a:pPr>
+            <a:r>
+              <a:rPr lang="en-GB" sz="3200" dirty="0"/>
+              <a:t>Cluster can be spun up with one line of code</a:t>
+            </a:r>
+          </a:p>
+          <a:p>
+            <a:pPr marL="0" indent="0">
+              <a:buNone/>
+            </a:pPr>
+            <a:r>
+              <a:rPr lang="en-GB" sz="3200" dirty="0"/>
+              <a:t>Applications deployed to cluster via </a:t>
+            </a:r>
+            <a:r>
+              <a:rPr lang="en-GB" sz="3200" dirty="0" err="1"/>
+              <a:t>yaml</a:t>
+            </a:r>
+            <a:r>
+              <a:rPr lang="en-GB" sz="3200" dirty="0"/>
+              <a:t> files</a:t>
+            </a:r>
+          </a:p>
+          <a:p>
+            <a:pPr marL="0" indent="0">
+              <a:buNone/>
+            </a:pPr>
+            <a:r>
+              <a:rPr lang="en-GB" sz="3200" dirty="0"/>
+              <a:t>Managed by Azure-CLI/</a:t>
+            </a:r>
+            <a:r>
+              <a:rPr lang="en-GB" sz="3200" dirty="0" err="1"/>
+              <a:t>powershell</a:t>
+            </a:r>
+            <a:r>
+              <a:rPr lang="en-GB" sz="3200" dirty="0"/>
+              <a:t> and </a:t>
+            </a:r>
+            <a:r>
+              <a:rPr lang="en-GB" sz="3200" dirty="0" err="1"/>
+              <a:t>kubectl</a:t>
+            </a:r>
+            <a:endParaRPr lang="en-GB" sz="3200" dirty="0"/>
+          </a:p>
+        </p:txBody>
+      </p:sp>
+    </p:spTree>
+    <p:extLst>
+      <p:ext uri="{BB962C8B-B14F-4D97-AF65-F5344CB8AC3E}">
+        <p14:creationId xmlns:p14="http://schemas.microsoft.com/office/powerpoint/2010/main" val="3069965736"/>
+      </p:ext>
+    </p:extLst>
+  </p:cSld>
+  <p:clrMapOvr>
+    <a:masterClrMapping/>
+  </p:clrMapOvr>
+</p:sld>
+</file>
+
+<file path=ppt/slides/slide27.xml><?xml version="1.0" encoding="utf-8"?>
+<p:sld xmlns:a="http://schemas.openxmlformats.org/drawingml/2006/main" xmlns:r="http://schemas.openxmlformats.org/officeDocument/2006/relationships" xmlns:p="http://schemas.openxmlformats.org/presentationml/2006/main">
+  <p:cSld>
+    <p:spTree>
+      <p:nvGrpSpPr>
+        <p:cNvPr id="1" name=""/>
+        <p:cNvGrpSpPr/>
+        <p:nvPr/>
+      </p:nvGrpSpPr>
+      <p:grpSpPr>
+        <a:xfrm>
+          <a:off x="0" y="0"/>
+          <a:ext cx="0" cy="0"/>
+          <a:chOff x="0" y="0"/>
+          <a:chExt cx="0" cy="0"/>
+        </a:xfrm>
+      </p:grpSpPr>
+      <p:sp>
+        <p:nvSpPr>
+          <p:cNvPr id="4" name="Title 3"/>
+          <p:cNvSpPr>
+            <a:spLocks noGrp="1"/>
+          </p:cNvSpPr>
+          <p:nvPr>
+            <p:ph type="title"/>
+          </p:nvPr>
+        </p:nvSpPr>
+        <p:spPr/>
+        <p:txBody>
+          <a:bodyPr>
+            <a:normAutofit/>
+          </a:bodyPr>
+          <a:lstStyle/>
+          <a:p>
+            <a:r>
+              <a:rPr lang="en-GB" dirty="0">
+                <a:solidFill>
+                  <a:schemeClr val="accent1"/>
+                </a:solidFill>
+              </a:rPr>
+              <a:t>Demo</a:t>
+            </a:r>
+          </a:p>
+        </p:txBody>
+      </p:sp>
+      <p:sp>
+        <p:nvSpPr>
+          <p:cNvPr id="2" name="Text Placeholder 1"/>
+          <p:cNvSpPr>
+            <a:spLocks noGrp="1"/>
+          </p:cNvSpPr>
+          <p:nvPr>
+            <p:ph type="body" idx="1"/>
+          </p:nvPr>
+        </p:nvSpPr>
+        <p:spPr/>
+        <p:txBody>
+          <a:bodyPr/>
+          <a:lstStyle/>
+          <a:p>
+            <a:endParaRPr lang="en-GB" dirty="0"/>
+          </a:p>
+        </p:txBody>
+      </p:sp>
+    </p:spTree>
+    <p:extLst>
+      <p:ext uri="{BB962C8B-B14F-4D97-AF65-F5344CB8AC3E}">
+        <p14:creationId xmlns:p14="http://schemas.microsoft.com/office/powerpoint/2010/main" val="2917938358"/>
+      </p:ext>
+    </p:extLst>
+  </p:cSld>
+  <p:clrMapOvr>
+    <a:masterClrMapping/>
+  </p:clrMapOvr>
+</p:sld>
+</file>
+
+<file path=ppt/slides/slide28.xml><?xml version="1.0" encoding="utf-8"?>
+<p:sld xmlns:a="http://schemas.openxmlformats.org/drawingml/2006/main" xmlns:r="http://schemas.openxmlformats.org/officeDocument/2006/relationships" xmlns:p="http://schemas.openxmlformats.org/presentationml/2006/main">
+  <p:cSld>
+    <p:spTree>
+      <p:nvGrpSpPr>
+        <p:cNvPr id="1" name=""/>
+        <p:cNvGrpSpPr/>
+        <p:nvPr/>
+      </p:nvGrpSpPr>
+      <p:grpSpPr>
+        <a:xfrm>
+          <a:off x="0" y="0"/>
+          <a:ext cx="0" cy="0"/>
+          <a:chOff x="0" y="0"/>
+          <a:chExt cx="0" cy="0"/>
+        </a:xfrm>
+      </p:grpSpPr>
+      <p:sp>
+        <p:nvSpPr>
           <p:cNvPr id="2" name="Title 1">
             <a:extLst>
               <a:ext uri="{FF2B5EF4-FFF2-40B4-BE49-F238E27FC236}">
@@ -4625,7 +5658,7 @@
 </p:sld>
 </file>
 
-<file path=ppt/slides/slide22.xml><?xml version="1.0" encoding="utf-8"?>
+<file path=ppt/slides/slide29.xml><?xml version="1.0" encoding="utf-8"?>
 <p:sld xmlns:a="http://schemas.openxmlformats.org/drawingml/2006/main" xmlns:r="http://schemas.openxmlformats.org/officeDocument/2006/relationships" xmlns:p="http://schemas.openxmlformats.org/presentationml/2006/main">
   <p:cSld>
     <p:spTree>
@@ -4996,9 +6029,7 @@
           </a:xfrm>
         </p:spPr>
         <p:txBody>
-          <a:bodyPr>
-            <a:normAutofit/>
-          </a:bodyPr>
+          <a:bodyPr/>
           <a:lstStyle/>
           <a:p>
             <a:r>
@@ -5009,7 +6040,7 @@
                   </a:schemeClr>
                 </a:solidFill>
               </a:rPr>
-              <a:t>Header</a:t>
+              <a:t>Agenda</a:t>
             </a:r>
           </a:p>
         </p:txBody>
@@ -5034,14 +6065,53 @@
             <a:pPr marL="0" indent="0">
               <a:buNone/>
             </a:pPr>
-            <a:endParaRPr lang="en-GB" sz="3200" dirty="0"/>
+            <a:r>
+              <a:rPr lang="en-GB" sz="3200" dirty="0"/>
+              <a:t>Running Docker on standalone VMs</a:t>
+            </a:r>
+          </a:p>
+          <a:p>
+            <a:pPr marL="0" indent="0">
+              <a:buNone/>
+            </a:pPr>
+            <a:r>
+              <a:rPr lang="en-GB" sz="3200" dirty="0"/>
+              <a:t>Docker for Azure</a:t>
+            </a:r>
+          </a:p>
+          <a:p>
+            <a:pPr marL="0" indent="0">
+              <a:buNone/>
+            </a:pPr>
+            <a:r>
+              <a:rPr lang="en-GB" sz="3200" dirty="0"/>
+              <a:t>Azure Container Registry</a:t>
+            </a:r>
+          </a:p>
+          <a:p>
+            <a:pPr marL="0" indent="0">
+              <a:buNone/>
+            </a:pPr>
+            <a:r>
+              <a:rPr lang="en-GB" sz="3200" dirty="0"/>
+              <a:t>Azure Container Instances</a:t>
+            </a:r>
+          </a:p>
+          <a:p>
+            <a:pPr marL="0" indent="0">
+              <a:buNone/>
+            </a:pPr>
+            <a:r>
+              <a:rPr lang="en-GB" sz="3200" dirty="0"/>
+              <a:t>Azure Container Services (ACS &amp; AKS)</a:t>
+            </a:r>
           </a:p>
         </p:txBody>
       </p:sp>
     </p:spTree>
     <p:extLst>
       <p:ext uri="{BB962C8B-B14F-4D97-AF65-F5344CB8AC3E}">
-        <p14:creationId xmlns:p14="http://schemas.microsoft.com/office/powerpoint/2010/main" val="2115193488"/>
+        <p14:creationId xmlns:p14="http://schemas.microsoft.com/office/powerpoint/2010/main" val="2857945194"/>
       </p:ext>
     </p:extLst>
   </p:cSld>
@@ -5070,7 +6140,7 @@
       </p:grpSpPr>
       <p:sp>
         <p:nvSpPr>
-          <p:cNvPr id="4" name="Title 3"/>
+          <p:cNvPr id="6" name="Title 5"/>
           <p:cNvSpPr>
             <a:spLocks noGrp="1"/>
           </p:cNvSpPr>
@@ -5078,7 +6148,12 @@
             <p:ph type="title"/>
           </p:nvPr>
         </p:nvSpPr>
-        <p:spPr/>
+        <p:spPr>
+          <a:xfrm>
+            <a:off x="331596" y="562708"/>
+            <a:ext cx="10184004" cy="713433"/>
+          </a:xfrm>
+        </p:spPr>
         <p:txBody>
           <a:bodyPr>
             <a:normAutofit/>
@@ -5088,37 +6163,110 @@
             <a:r>
               <a:rPr lang="en-GB" dirty="0">
                 <a:solidFill>
-                  <a:schemeClr val="accent1"/>
+                  <a:schemeClr val="accent1">
+                    <a:lumMod val="75000"/>
+                  </a:schemeClr>
                 </a:solidFill>
               </a:rPr>
-              <a:t>Running Docker on VMs</a:t>
-            </a:r>
-          </a:p>
-        </p:txBody>
-      </p:sp>
-      <p:sp>
-        <p:nvSpPr>
-          <p:cNvPr id="2" name="Text Placeholder 1"/>
-          <p:cNvSpPr>
-            <a:spLocks noGrp="1"/>
-          </p:cNvSpPr>
-          <p:nvPr>
-            <p:ph type="body" idx="1"/>
+              <a:t>Tools – Azure CLI</a:t>
+            </a:r>
+          </a:p>
+        </p:txBody>
+      </p:sp>
+      <p:sp>
+        <p:nvSpPr>
+          <p:cNvPr id="3" name="Subtitle 2"/>
+          <p:cNvSpPr>
+            <a:spLocks noGrp="1"/>
+          </p:cNvSpPr>
+          <p:nvPr>
+            <p:ph idx="1"/>
           </p:nvPr>
         </p:nvSpPr>
         <p:spPr/>
         <p:txBody>
-          <a:bodyPr/>
-          <a:lstStyle/>
-          <a:p>
-            <a:endParaRPr lang="en-GB" dirty="0"/>
-          </a:p>
-        </p:txBody>
-      </p:sp>
+          <a:bodyPr>
+            <a:normAutofit/>
+          </a:bodyPr>
+          <a:lstStyle/>
+          <a:p>
+            <a:pPr marL="0" indent="0">
+              <a:buNone/>
+            </a:pPr>
+            <a:r>
+              <a:rPr lang="en-GB" sz="3200" dirty="0"/>
+              <a:t>Command line tool for managing Azure resources</a:t>
+            </a:r>
+          </a:p>
+          <a:p>
+            <a:pPr marL="0" indent="0">
+              <a:buNone/>
+            </a:pPr>
+            <a:r>
+              <a:rPr lang="en-GB" sz="3200" dirty="0"/>
+              <a:t>Available on Windows, Mac, or Linux (incl. WSL)</a:t>
+            </a:r>
+          </a:p>
+          <a:p>
+            <a:pPr marL="0" indent="0">
+              <a:buNone/>
+            </a:pPr>
+            <a:r>
+              <a:rPr lang="en-GB" sz="2400" dirty="0">
+                <a:hlinkClick r:id="rId2"/>
+              </a:rPr>
+              <a:t>https://docs.microsoft.com/en-us/cli/azure/install-azure-cli?view=azure-cli-latest</a:t>
+            </a:r>
+            <a:endParaRPr lang="en-GB" sz="2400" dirty="0"/>
+          </a:p>
+          <a:p>
+            <a:pPr marL="0" indent="0">
+              <a:buNone/>
+            </a:pPr>
+            <a:endParaRPr lang="en-GB" sz="3200" dirty="0"/>
+          </a:p>
+        </p:txBody>
+      </p:sp>
+      <p:pic>
+        <p:nvPicPr>
+          <p:cNvPr id="4" name="Picture 3" descr="A screen shot of a computer&#10;&#10;Description generated with high confidence">
+            <a:extLst>
+              <a:ext uri="{FF2B5EF4-FFF2-40B4-BE49-F238E27FC236}">
+                <a16:creationId xmlns:a16="http://schemas.microsoft.com/office/drawing/2014/main" id="{4567A477-39FF-4F40-9C76-D7F68FB29486}"/>
+              </a:ext>
+            </a:extLst>
+          </p:cNvPr>
+          <p:cNvPicPr>
+            <a:picLocks noChangeAspect="1"/>
+          </p:cNvPicPr>
+          <p:nvPr/>
+        </p:nvPicPr>
+        <p:blipFill>
+          <a:blip r:embed="rId3">
+            <a:extLst>
+              <a:ext uri="{28A0092B-C50C-407E-A947-70E740481C1C}">
+                <a14:useLocalDpi xmlns:a14="http://schemas.microsoft.com/office/drawing/2010/main" val="0"/>
+              </a:ext>
+            </a:extLst>
+          </a:blip>
+          <a:stretch>
+            <a:fillRect/>
+          </a:stretch>
+        </p:blipFill>
+        <p:spPr>
+          <a:xfrm>
+            <a:off x="1924658" y="4001294"/>
+            <a:ext cx="8342684" cy="1740745"/>
+          </a:xfrm>
+          <a:prstGeom prst="rect">
+            <a:avLst/>
+          </a:prstGeom>
+        </p:spPr>
+      </p:pic>
     </p:spTree>
     <p:extLst>
       <p:ext uri="{BB962C8B-B14F-4D97-AF65-F5344CB8AC3E}">
-        <p14:creationId xmlns:p14="http://schemas.microsoft.com/office/powerpoint/2010/main" val="1078281942"/>
+        <p14:creationId xmlns:p14="http://schemas.microsoft.com/office/powerpoint/2010/main" val="3234115181"/>
       </p:ext>
     </p:extLst>
   </p:cSld>
@@ -5157,7 +6305,7 @@
         </p:nvSpPr>
         <p:spPr>
           <a:xfrm>
-            <a:off x="331596" y="562708"/>
+            <a:off x="331596" y="122399"/>
             <a:ext cx="10184004" cy="713433"/>
           </a:xfrm>
         </p:spPr>
@@ -5175,39 +6323,50 @@
                   </a:schemeClr>
                 </a:solidFill>
               </a:rPr>
-              <a:t>Header</a:t>
-            </a:r>
-          </a:p>
-        </p:txBody>
-      </p:sp>
-      <p:sp>
-        <p:nvSpPr>
-          <p:cNvPr id="3" name="Subtitle 2"/>
-          <p:cNvSpPr>
-            <a:spLocks noGrp="1"/>
-          </p:cNvSpPr>
+              <a:t>Tools – Visual Studio Code</a:t>
+            </a:r>
+          </a:p>
+        </p:txBody>
+      </p:sp>
+      <p:pic>
+        <p:nvPicPr>
+          <p:cNvPr id="4" name="Content Placeholder 3" descr="A screenshot of a cell phone&#10;&#10;Description generated with very high confidence">
+            <a:extLst>
+              <a:ext uri="{FF2B5EF4-FFF2-40B4-BE49-F238E27FC236}">
+                <a16:creationId xmlns:a16="http://schemas.microsoft.com/office/drawing/2014/main" id="{52E41142-B10C-4153-A0BC-1D74BFB578EC}"/>
+              </a:ext>
+            </a:extLst>
+          </p:cNvPr>
+          <p:cNvPicPr>
+            <a:picLocks noGrp="1" noChangeAspect="1"/>
+          </p:cNvPicPr>
           <p:nvPr>
             <p:ph idx="1"/>
           </p:nvPr>
-        </p:nvSpPr>
-        <p:spPr/>
-        <p:txBody>
-          <a:bodyPr>
-            <a:normAutofit/>
-          </a:bodyPr>
-          <a:lstStyle/>
-          <a:p>
-            <a:pPr marL="0" indent="0">
-              <a:buNone/>
-            </a:pPr>
-            <a:endParaRPr lang="en-GB" sz="3200" dirty="0"/>
-          </a:p>
-        </p:txBody>
-      </p:sp>
+        </p:nvPicPr>
+        <p:blipFill>
+          <a:blip r:embed="rId2">
+            <a:extLst>
+              <a:ext uri="{28A0092B-C50C-407E-A947-70E740481C1C}">
+                <a14:useLocalDpi xmlns:a14="http://schemas.microsoft.com/office/drawing/2010/main" val="0"/>
+              </a:ext>
+            </a:extLst>
+          </a:blip>
+          <a:stretch>
+            <a:fillRect/>
+          </a:stretch>
+        </p:blipFill>
+        <p:spPr>
+          <a:xfrm>
+            <a:off x="1059426" y="835832"/>
+            <a:ext cx="10073148" cy="5956568"/>
+          </a:xfrm>
+        </p:spPr>
+      </p:pic>
     </p:spTree>
     <p:extLst>
       <p:ext uri="{BB962C8B-B14F-4D97-AF65-F5344CB8AC3E}">
-        <p14:creationId xmlns:p14="http://schemas.microsoft.com/office/powerpoint/2010/main" val="1081040829"/>
+        <p14:creationId xmlns:p14="http://schemas.microsoft.com/office/powerpoint/2010/main" val="3854572157"/>
       </p:ext>
     </p:extLst>
   </p:cSld>
@@ -5236,7 +6395,7 @@
       </p:grpSpPr>
       <p:sp>
         <p:nvSpPr>
-          <p:cNvPr id="4" name="Title 3"/>
+          <p:cNvPr id="6" name="Title 5"/>
           <p:cNvSpPr>
             <a:spLocks noGrp="1"/>
           </p:cNvSpPr>
@@ -5244,7 +6403,12 @@
             <p:ph type="title"/>
           </p:nvPr>
         </p:nvSpPr>
-        <p:spPr/>
+        <p:spPr>
+          <a:xfrm>
+            <a:off x="331596" y="562708"/>
+            <a:ext cx="10184004" cy="713433"/>
+          </a:xfrm>
+        </p:spPr>
         <p:txBody>
           <a:bodyPr>
             <a:normAutofit/>
@@ -5254,37 +6418,132 @@
             <a:r>
               <a:rPr lang="en-GB" dirty="0">
                 <a:solidFill>
-                  <a:schemeClr val="accent1"/>
+                  <a:schemeClr val="accent1">
+                    <a:lumMod val="75000"/>
+                  </a:schemeClr>
                 </a:solidFill>
               </a:rPr>
-              <a:t>Demo</a:t>
-            </a:r>
-          </a:p>
-        </p:txBody>
-      </p:sp>
-      <p:sp>
-        <p:nvSpPr>
-          <p:cNvPr id="2" name="Text Placeholder 1"/>
-          <p:cNvSpPr>
-            <a:spLocks noGrp="1"/>
-          </p:cNvSpPr>
-          <p:nvPr>
-            <p:ph type="body" idx="1"/>
-          </p:nvPr>
-        </p:nvSpPr>
-        <p:spPr/>
-        <p:txBody>
-          <a:bodyPr/>
-          <a:lstStyle/>
-          <a:p>
-            <a:endParaRPr lang="en-GB" dirty="0"/>
-          </a:p>
-        </p:txBody>
-      </p:sp>
+              <a:t>Tools – </a:t>
+            </a:r>
+            <a:r>
+              <a:rPr lang="en-GB" dirty="0" err="1">
+                <a:solidFill>
+                  <a:schemeClr val="accent1">
+                    <a:lumMod val="75000"/>
+                  </a:schemeClr>
+                </a:solidFill>
+              </a:rPr>
+              <a:t>Powershell</a:t>
+            </a:r>
+            <a:endParaRPr lang="en-GB" dirty="0">
+              <a:solidFill>
+                <a:schemeClr val="accent1">
+                  <a:lumMod val="75000"/>
+                </a:schemeClr>
+              </a:solidFill>
+            </a:endParaRPr>
+          </a:p>
+        </p:txBody>
+      </p:sp>
+      <p:sp>
+        <p:nvSpPr>
+          <p:cNvPr id="3" name="Subtitle 2"/>
+          <p:cNvSpPr>
+            <a:spLocks noGrp="1"/>
+          </p:cNvSpPr>
+          <p:nvPr>
+            <p:ph idx="1"/>
+          </p:nvPr>
+        </p:nvSpPr>
+        <p:spPr>
+          <a:xfrm>
+            <a:off x="331596" y="2172929"/>
+            <a:ext cx="4584533" cy="3611866"/>
+          </a:xfrm>
+        </p:spPr>
+        <p:txBody>
+          <a:bodyPr>
+            <a:normAutofit/>
+          </a:bodyPr>
+          <a:lstStyle/>
+          <a:p>
+            <a:pPr marL="0" indent="0">
+              <a:buNone/>
+            </a:pPr>
+            <a:r>
+              <a:rPr lang="en-GB" sz="2400" dirty="0" err="1"/>
+              <a:t>AzureRM</a:t>
+            </a:r>
+            <a:r>
+              <a:rPr lang="en-GB" sz="2400" dirty="0"/>
+              <a:t> module</a:t>
+            </a:r>
+          </a:p>
+          <a:p>
+            <a:pPr marL="0" indent="0">
+              <a:buNone/>
+            </a:pPr>
+            <a:r>
+              <a:rPr lang="en-GB" sz="2400" dirty="0"/>
+              <a:t>Install locally or in </a:t>
+            </a:r>
+            <a:r>
+              <a:rPr lang="en-GB" sz="2400" dirty="0" err="1"/>
+              <a:t>CloudShell</a:t>
+            </a:r>
+            <a:endParaRPr lang="en-GB" sz="2400" dirty="0"/>
+          </a:p>
+          <a:p>
+            <a:pPr marL="0" indent="0">
+              <a:buNone/>
+            </a:pPr>
+            <a:r>
+              <a:rPr lang="en-GB" sz="2400" dirty="0"/>
+              <a:t>Huge amount of commands available</a:t>
+            </a:r>
+          </a:p>
+        </p:txBody>
+      </p:sp>
+      <p:pic>
+        <p:nvPicPr>
+          <p:cNvPr id="7" name="Picture 6">
+            <a:extLst>
+              <a:ext uri="{FF2B5EF4-FFF2-40B4-BE49-F238E27FC236}">
+                <a16:creationId xmlns:a16="http://schemas.microsoft.com/office/drawing/2014/main" id="{7E55A805-C88A-4382-A04F-D720AB3C8538}"/>
+              </a:ext>
+            </a:extLst>
+          </p:cNvPr>
+          <p:cNvPicPr>
+            <a:picLocks noChangeAspect="1"/>
+          </p:cNvPicPr>
+          <p:nvPr/>
+        </p:nvPicPr>
+        <p:blipFill>
+          <a:blip r:embed="rId2">
+            <a:extLst>
+              <a:ext uri="{28A0092B-C50C-407E-A947-70E740481C1C}">
+                <a14:useLocalDpi xmlns:a14="http://schemas.microsoft.com/office/drawing/2010/main" val="0"/>
+              </a:ext>
+            </a:extLst>
+          </a:blip>
+          <a:stretch>
+            <a:fillRect/>
+          </a:stretch>
+        </p:blipFill>
+        <p:spPr>
+          <a:xfrm>
+            <a:off x="4669501" y="1525375"/>
+            <a:ext cx="7190903" cy="4259420"/>
+          </a:xfrm>
+          <a:prstGeom prst="rect">
+            <a:avLst/>
+          </a:prstGeom>
+        </p:spPr>
+      </p:pic>
     </p:spTree>
     <p:extLst>
       <p:ext uri="{BB962C8B-B14F-4D97-AF65-F5344CB8AC3E}">
-        <p14:creationId xmlns:p14="http://schemas.microsoft.com/office/powerpoint/2010/main" val="3428425072"/>
+        <p14:creationId xmlns:p14="http://schemas.microsoft.com/office/powerpoint/2010/main" val="3434267780"/>
       </p:ext>
     </p:extLst>
   </p:cSld>
@@ -5334,7 +6593,7 @@
                   <a:schemeClr val="accent1"/>
                 </a:solidFill>
               </a:rPr>
-              <a:t>Docker for Azure (Swarm)</a:t>
+              <a:t>Running Docker on VMs</a:t>
             </a:r>
           </a:p>
         </p:txBody>
@@ -5361,7 +6620,7 @@
     </p:spTree>
     <p:extLst>
       <p:ext uri="{BB962C8B-B14F-4D97-AF65-F5344CB8AC3E}">
-        <p14:creationId xmlns:p14="http://schemas.microsoft.com/office/powerpoint/2010/main" val="3610026559"/>
+        <p14:creationId xmlns:p14="http://schemas.microsoft.com/office/powerpoint/2010/main" val="1078281942"/>
       </p:ext>
     </p:extLst>
   </p:cSld>

</xml_diff>

<commit_message>
further updates to ACR slides
</commit_message>
<xml_diff>
--- a/ContainersInTheCloud.pptx
+++ b/ContainersInTheCloud.pptx
@@ -6024,7 +6024,7 @@
             </a:r>
             <a:r>
               <a:rPr lang="en-GB" sz="3200" dirty="0"/>
-              <a:t> -S localhost,15666 -U </a:t>
+              <a:t> -S . -U </a:t>
             </a:r>
             <a:r>
               <a:rPr lang="en-GB" sz="3200" dirty="0" err="1"/>
@@ -6032,7 +6032,7 @@
             </a:r>
             <a:r>
               <a:rPr lang="en-GB" sz="3200" dirty="0"/>
-              <a:t> -P Testing1122 \</a:t>
+              <a:t> -P $SA_PASSWORD \</a:t>
             </a:r>
           </a:p>
           <a:p>
@@ -6055,7 +6055,7 @@
             </a:r>
             <a:r>
               <a:rPr lang="en-GB" sz="2600" dirty="0" err="1"/>
-              <a:t>DatabaseC</a:t>
+              <a:t>DatabaseA</a:t>
             </a:r>
             <a:r>
               <a:rPr lang="en-GB" sz="2600" dirty="0"/>
@@ -6285,10 +6285,10 @@
       </p:sp>
       <p:pic>
         <p:nvPicPr>
-          <p:cNvPr id="8" name="Picture 7">
+          <p:cNvPr id="2" name="Picture 1">
             <a:extLst>
               <a:ext uri="{FF2B5EF4-FFF2-40B4-BE49-F238E27FC236}">
-                <a16:creationId xmlns:a16="http://schemas.microsoft.com/office/drawing/2014/main" id="{36B2BB5C-FFA9-4F63-97C4-C54AC615F26E}"/>
+                <a16:creationId xmlns:a16="http://schemas.microsoft.com/office/drawing/2014/main" id="{98BE8CFB-E3CC-4DB1-8CB1-594D095965DF}"/>
               </a:ext>
             </a:extLst>
           </p:cNvPr>
@@ -6305,8 +6305,8 @@
         </p:blipFill>
         <p:spPr>
           <a:xfrm>
-            <a:off x="658342" y="1175098"/>
-            <a:ext cx="10875316" cy="5511766"/>
+            <a:off x="338767" y="1100283"/>
+            <a:ext cx="11582400" cy="5619750"/>
           </a:xfrm>
           <a:prstGeom prst="rect">
             <a:avLst/>
@@ -6569,7 +6569,7 @@
         <p:spPr>
           <a:xfrm>
             <a:off x="289560" y="919538"/>
-            <a:ext cx="10515600" cy="892637"/>
+            <a:ext cx="11508188" cy="892637"/>
           </a:xfrm>
         </p:spPr>
         <p:txBody>
@@ -6588,22 +6588,7 @@
                 </a:solidFill>
                 <a:latin typeface="Consolas" panose="020B0609020204030204" pitchFamily="49" charset="0"/>
               </a:rPr>
-              <a:t>docker push </a:t>
-            </a:r>
-            <a:r>
-              <a:rPr lang="en-IE" sz="2400" dirty="0">
-                <a:latin typeface="Consolas" panose="020B0609020204030204" pitchFamily="49" charset="0"/>
-              </a:rPr>
-              <a:t>`</a:t>
-            </a:r>
-            <a:r>
-              <a:rPr lang="en-IE" sz="2400" dirty="0">
-                <a:solidFill>
-                  <a:srgbClr val="0000FF"/>
-                </a:solidFill>
-                <a:latin typeface="Consolas" panose="020B0609020204030204" pitchFamily="49" charset="0"/>
-              </a:rPr>
-              <a:t> 	testcontainerregistry01.azurecr.io/</a:t>
+              <a:t>docker push testcontainerregistry01.azurecr.io/</a:t>
             </a:r>
             <a:r>
               <a:rPr lang="en-IE" sz="2400" dirty="0" err="1">
@@ -6661,7 +6646,7 @@
         </p:blipFill>
         <p:spPr>
           <a:xfrm>
-            <a:off x="579034" y="1860339"/>
+            <a:off x="579034" y="1701313"/>
             <a:ext cx="10765682" cy="4414058"/>
           </a:xfrm>
           <a:prstGeom prst="rect">
@@ -6751,8 +6736,8 @@
         </p:nvSpPr>
         <p:spPr>
           <a:xfrm>
-            <a:off x="289560" y="886287"/>
-            <a:ext cx="10515600" cy="936625"/>
+            <a:off x="309439" y="1076648"/>
+            <a:ext cx="11736788" cy="713434"/>
           </a:xfrm>
         </p:spPr>
         <p:txBody>
@@ -6799,26 +6784,6 @@
                 <a:latin typeface="Consolas" panose="020B0609020204030204" pitchFamily="49" charset="0"/>
               </a:rPr>
               <a:t> repository list </a:t>
-            </a:r>
-            <a:r>
-              <a:rPr lang="en-US" sz="2400" dirty="0">
-                <a:latin typeface="Consolas" panose="020B0609020204030204" pitchFamily="49" charset="0"/>
-              </a:rPr>
-              <a:t>`</a:t>
-            </a:r>
-          </a:p>
-          <a:p>
-            <a:pPr marL="0" indent="0">
-              <a:buNone/>
-            </a:pPr>
-            <a:r>
-              <a:rPr lang="en-US" sz="2400" dirty="0">
-                <a:solidFill>
-                  <a:srgbClr val="0000FF"/>
-                </a:solidFill>
-                <a:latin typeface="Consolas" panose="020B0609020204030204" pitchFamily="49" charset="0"/>
-              </a:rPr>
-              <a:t>	</a:t>
             </a:r>
             <a:r>
               <a:rPr lang="en-US" sz="2400" dirty="0">
@@ -6893,7 +6858,7 @@
         </p:blipFill>
         <p:spPr>
           <a:xfrm>
-            <a:off x="1066800" y="2376487"/>
+            <a:off x="1066800" y="2306913"/>
             <a:ext cx="10058400" cy="2105025"/>
           </a:xfrm>
           <a:prstGeom prst="rect">
@@ -7320,7 +7285,7 @@
                 </a:solidFill>
                 <a:latin typeface="Consolas" panose="020B0609020204030204" pitchFamily="49" charset="0"/>
               </a:rPr>
-              <a:t>apcontainerregistry01 </a:t>
+              <a:t>testcontainerregistry01 </a:t>
             </a:r>
             <a:r>
               <a:rPr lang="en-US" sz="2400" dirty="0">
@@ -7358,7 +7323,7 @@
                 </a:solidFill>
                 <a:latin typeface="Consolas" panose="020B0609020204030204" pitchFamily="49" charset="0"/>
               </a:rPr>
-              <a:t>sqlserverlinuxagent</a:t>
+              <a:t>devsqlimage</a:t>
             </a:r>
             <a:endParaRPr lang="en-US" sz="2400" dirty="0">
               <a:solidFill>

</xml_diff>

<commit_message>
updates to demos and slides
</commit_message>
<xml_diff>
--- a/ContainersInTheCloud.pptx
+++ b/ContainersInTheCloud.pptx
@@ -5,7 +5,7 @@
     <p:sldMasterId id="2147483648" r:id="rId1"/>
   </p:sldMasterIdLst>
   <p:notesMasterIdLst>
-    <p:notesMasterId r:id="rId43"/>
+    <p:notesMasterId r:id="rId46"/>
   </p:notesMasterIdLst>
   <p:sldIdLst>
     <p:sldId id="256" r:id="rId2"/>
@@ -39,16 +39,19 @@
     <p:sldId id="334" r:id="rId30"/>
     <p:sldId id="345" r:id="rId31"/>
     <p:sldId id="352" r:id="rId32"/>
-    <p:sldId id="314" r:id="rId33"/>
-    <p:sldId id="335" r:id="rId34"/>
-    <p:sldId id="348" r:id="rId35"/>
-    <p:sldId id="336" r:id="rId36"/>
-    <p:sldId id="349" r:id="rId37"/>
-    <p:sldId id="337" r:id="rId38"/>
-    <p:sldId id="325" r:id="rId39"/>
-    <p:sldId id="332" r:id="rId40"/>
-    <p:sldId id="284" r:id="rId41"/>
-    <p:sldId id="290" r:id="rId42"/>
+    <p:sldId id="367" r:id="rId33"/>
+    <p:sldId id="368" r:id="rId34"/>
+    <p:sldId id="366" r:id="rId35"/>
+    <p:sldId id="314" r:id="rId36"/>
+    <p:sldId id="335" r:id="rId37"/>
+    <p:sldId id="348" r:id="rId38"/>
+    <p:sldId id="336" r:id="rId39"/>
+    <p:sldId id="349" r:id="rId40"/>
+    <p:sldId id="337" r:id="rId41"/>
+    <p:sldId id="325" r:id="rId42"/>
+    <p:sldId id="332" r:id="rId43"/>
+    <p:sldId id="284" r:id="rId44"/>
+    <p:sldId id="290" r:id="rId45"/>
   </p:sldIdLst>
   <p:sldSz cx="12192000" cy="6858000"/>
   <p:notesSz cx="6858000" cy="9144000"/>
@@ -248,7 +251,7 @@
           <a:p>
             <a:fld id="{5DD5D27D-F6C1-457C-97EB-5B89E5036C9E}" type="datetimeFigureOut">
               <a:rPr lang="en-IE" smtClean="0"/>
-              <a:t>13/05/2018</a:t>
+              <a:t>15/05/2018</a:t>
             </a:fld>
             <a:endParaRPr lang="en-IE"/>
           </a:p>
@@ -647,7 +650,7 @@
           <a:p>
             <a:fld id="{A64C863B-FA9B-4512-A178-D5CD000B838D}" type="datetimeFigureOut">
               <a:rPr lang="en-GB" smtClean="0"/>
-              <a:t>13/05/2018</a:t>
+              <a:t>15/05/2018</a:t>
             </a:fld>
             <a:endParaRPr lang="en-GB"/>
           </a:p>
@@ -817,7 +820,7 @@
           <a:p>
             <a:fld id="{A64C863B-FA9B-4512-A178-D5CD000B838D}" type="datetimeFigureOut">
               <a:rPr lang="en-GB" smtClean="0"/>
-              <a:t>13/05/2018</a:t>
+              <a:t>15/05/2018</a:t>
             </a:fld>
             <a:endParaRPr lang="en-GB"/>
           </a:p>
@@ -997,7 +1000,7 @@
           <a:p>
             <a:fld id="{A64C863B-FA9B-4512-A178-D5CD000B838D}" type="datetimeFigureOut">
               <a:rPr lang="en-GB" smtClean="0"/>
-              <a:t>13/05/2018</a:t>
+              <a:t>15/05/2018</a:t>
             </a:fld>
             <a:endParaRPr lang="en-GB"/>
           </a:p>
@@ -1167,7 +1170,7 @@
           <a:p>
             <a:fld id="{A64C863B-FA9B-4512-A178-D5CD000B838D}" type="datetimeFigureOut">
               <a:rPr lang="en-GB" smtClean="0"/>
-              <a:t>13/05/2018</a:t>
+              <a:t>15/05/2018</a:t>
             </a:fld>
             <a:endParaRPr lang="en-GB"/>
           </a:p>
@@ -1413,7 +1416,7 @@
           <a:p>
             <a:fld id="{A64C863B-FA9B-4512-A178-D5CD000B838D}" type="datetimeFigureOut">
               <a:rPr lang="en-GB" smtClean="0"/>
-              <a:t>13/05/2018</a:t>
+              <a:t>15/05/2018</a:t>
             </a:fld>
             <a:endParaRPr lang="en-GB"/>
           </a:p>
@@ -1645,7 +1648,7 @@
           <a:p>
             <a:fld id="{A64C863B-FA9B-4512-A178-D5CD000B838D}" type="datetimeFigureOut">
               <a:rPr lang="en-GB" smtClean="0"/>
-              <a:t>13/05/2018</a:t>
+              <a:t>15/05/2018</a:t>
             </a:fld>
             <a:endParaRPr lang="en-GB"/>
           </a:p>
@@ -2012,7 +2015,7 @@
           <a:p>
             <a:fld id="{A64C863B-FA9B-4512-A178-D5CD000B838D}" type="datetimeFigureOut">
               <a:rPr lang="en-GB" smtClean="0"/>
-              <a:t>13/05/2018</a:t>
+              <a:t>15/05/2018</a:t>
             </a:fld>
             <a:endParaRPr lang="en-GB"/>
           </a:p>
@@ -2130,7 +2133,7 @@
           <a:p>
             <a:fld id="{A64C863B-FA9B-4512-A178-D5CD000B838D}" type="datetimeFigureOut">
               <a:rPr lang="en-GB" smtClean="0"/>
-              <a:t>13/05/2018</a:t>
+              <a:t>15/05/2018</a:t>
             </a:fld>
             <a:endParaRPr lang="en-GB"/>
           </a:p>
@@ -2225,7 +2228,7 @@
           <a:p>
             <a:fld id="{A64C863B-FA9B-4512-A178-D5CD000B838D}" type="datetimeFigureOut">
               <a:rPr lang="en-GB" smtClean="0"/>
-              <a:t>13/05/2018</a:t>
+              <a:t>15/05/2018</a:t>
             </a:fld>
             <a:endParaRPr lang="en-GB"/>
           </a:p>
@@ -2502,7 +2505,7 @@
           <a:p>
             <a:fld id="{A64C863B-FA9B-4512-A178-D5CD000B838D}" type="datetimeFigureOut">
               <a:rPr lang="en-GB" smtClean="0"/>
-              <a:t>13/05/2018</a:t>
+              <a:t>15/05/2018</a:t>
             </a:fld>
             <a:endParaRPr lang="en-GB"/>
           </a:p>
@@ -2755,7 +2758,7 @@
           <a:p>
             <a:fld id="{A64C863B-FA9B-4512-A178-D5CD000B838D}" type="datetimeFigureOut">
               <a:rPr lang="en-GB" smtClean="0"/>
-              <a:t>13/05/2018</a:t>
+              <a:t>15/05/2018</a:t>
             </a:fld>
             <a:endParaRPr lang="en-GB"/>
           </a:p>
@@ -2977,7 +2980,7 @@
           <a:p>
             <a:fld id="{A64C863B-FA9B-4512-A178-D5CD000B838D}" type="datetimeFigureOut">
               <a:rPr lang="en-GB" smtClean="0"/>
-              <a:t>13/05/2018</a:t>
+              <a:t>15/05/2018</a:t>
             </a:fld>
             <a:endParaRPr lang="en-GB"/>
           </a:p>
@@ -7988,7 +7991,7 @@
                   </a:schemeClr>
                 </a:solidFill>
               </a:rPr>
-              <a:t>Azure Container Instances</a:t>
+              <a:t>ACI – Get ACR Credentials</a:t>
             </a:r>
           </a:p>
         </p:txBody>
@@ -8009,6 +8012,213 @@
             <a:normAutofit/>
           </a:bodyPr>
           <a:lstStyle/>
+          <a:p>
+            <a:pPr marL="0" indent="0">
+              <a:buNone/>
+            </a:pPr>
+            <a:r>
+              <a:rPr lang="en-IE" sz="2400" dirty="0">
+                <a:solidFill>
+                  <a:srgbClr val="008000"/>
+                </a:solidFill>
+                <a:latin typeface="Consolas" panose="020B0609020204030204" pitchFamily="49" charset="0"/>
+              </a:rPr>
+              <a:t># enable admin</a:t>
+            </a:r>
+            <a:endParaRPr lang="en-IE" sz="2400" dirty="0">
+              <a:solidFill>
+                <a:srgbClr val="000000"/>
+              </a:solidFill>
+              <a:latin typeface="Consolas" panose="020B0609020204030204" pitchFamily="49" charset="0"/>
+            </a:endParaRPr>
+          </a:p>
+          <a:p>
+            <a:pPr marL="0" indent="0">
+              <a:buNone/>
+            </a:pPr>
+            <a:r>
+              <a:rPr lang="en-IE" sz="2400" dirty="0" err="1">
+                <a:solidFill>
+                  <a:srgbClr val="0000FF"/>
+                </a:solidFill>
+                <a:latin typeface="Consolas" panose="020B0609020204030204" pitchFamily="49" charset="0"/>
+              </a:rPr>
+              <a:t>az</a:t>
+            </a:r>
+            <a:r>
+              <a:rPr lang="en-IE" sz="2400" dirty="0">
+                <a:solidFill>
+                  <a:srgbClr val="0000FF"/>
+                </a:solidFill>
+                <a:latin typeface="Consolas" panose="020B0609020204030204" pitchFamily="49" charset="0"/>
+              </a:rPr>
+              <a:t> </a:t>
+            </a:r>
+            <a:r>
+              <a:rPr lang="en-IE" sz="2400" dirty="0" err="1">
+                <a:solidFill>
+                  <a:srgbClr val="0000FF"/>
+                </a:solidFill>
+                <a:latin typeface="Consolas" panose="020B0609020204030204" pitchFamily="49" charset="0"/>
+              </a:rPr>
+              <a:t>acr</a:t>
+            </a:r>
+            <a:r>
+              <a:rPr lang="en-IE" sz="2400" dirty="0">
+                <a:solidFill>
+                  <a:srgbClr val="0000FF"/>
+                </a:solidFill>
+                <a:latin typeface="Consolas" panose="020B0609020204030204" pitchFamily="49" charset="0"/>
+              </a:rPr>
+              <a:t> update </a:t>
+            </a:r>
+            <a:r>
+              <a:rPr lang="en-IE" sz="2400" dirty="0">
+                <a:solidFill>
+                  <a:srgbClr val="000000"/>
+                </a:solidFill>
+                <a:latin typeface="Consolas" panose="020B0609020204030204" pitchFamily="49" charset="0"/>
+              </a:rPr>
+              <a:t>-n </a:t>
+            </a:r>
+            <a:r>
+              <a:rPr lang="en-IE" sz="2400" dirty="0">
+                <a:solidFill>
+                  <a:srgbClr val="A31515"/>
+                </a:solidFill>
+                <a:latin typeface="Consolas" panose="020B0609020204030204" pitchFamily="49" charset="0"/>
+              </a:rPr>
+              <a:t>TestContainerRegistry01 </a:t>
+            </a:r>
+            <a:r>
+              <a:rPr lang="en-IE" sz="2400" dirty="0">
+                <a:solidFill>
+                  <a:srgbClr val="000000"/>
+                </a:solidFill>
+                <a:latin typeface="Consolas" panose="020B0609020204030204" pitchFamily="49" charset="0"/>
+              </a:rPr>
+              <a:t>--admin-enabled </a:t>
+            </a:r>
+            <a:r>
+              <a:rPr lang="en-IE" sz="2400" dirty="0">
+                <a:solidFill>
+                  <a:srgbClr val="A31515"/>
+                </a:solidFill>
+                <a:latin typeface="Consolas" panose="020B0609020204030204" pitchFamily="49" charset="0"/>
+              </a:rPr>
+              <a:t>true</a:t>
+            </a:r>
+            <a:endParaRPr lang="en-IE" sz="2400" dirty="0">
+              <a:solidFill>
+                <a:srgbClr val="000000"/>
+              </a:solidFill>
+              <a:latin typeface="Consolas" panose="020B0609020204030204" pitchFamily="49" charset="0"/>
+            </a:endParaRPr>
+          </a:p>
+          <a:p>
+            <a:pPr marL="0" indent="0">
+              <a:buNone/>
+            </a:pPr>
+            <a:endParaRPr lang="en-IE" sz="2400" dirty="0">
+              <a:solidFill>
+                <a:srgbClr val="000000"/>
+              </a:solidFill>
+              <a:latin typeface="Consolas" panose="020B0609020204030204" pitchFamily="49" charset="0"/>
+            </a:endParaRPr>
+          </a:p>
+          <a:p>
+            <a:pPr marL="0" indent="0">
+              <a:buNone/>
+            </a:pPr>
+            <a:br>
+              <a:rPr lang="en-IE" sz="2400" dirty="0">
+                <a:solidFill>
+                  <a:srgbClr val="000000"/>
+                </a:solidFill>
+                <a:latin typeface="Consolas" panose="020B0609020204030204" pitchFamily="49" charset="0"/>
+              </a:rPr>
+            </a:br>
+            <a:r>
+              <a:rPr lang="en-IE" sz="2400" dirty="0">
+                <a:solidFill>
+                  <a:srgbClr val="008000"/>
+                </a:solidFill>
+                <a:latin typeface="Consolas" panose="020B0609020204030204" pitchFamily="49" charset="0"/>
+              </a:rPr>
+              <a:t># get credentials</a:t>
+            </a:r>
+            <a:endParaRPr lang="en-IE" sz="2400" dirty="0">
+              <a:solidFill>
+                <a:srgbClr val="000000"/>
+              </a:solidFill>
+              <a:latin typeface="Consolas" panose="020B0609020204030204" pitchFamily="49" charset="0"/>
+            </a:endParaRPr>
+          </a:p>
+          <a:p>
+            <a:pPr marL="0" indent="0">
+              <a:buNone/>
+            </a:pPr>
+            <a:r>
+              <a:rPr lang="en-IE" sz="2400" dirty="0" err="1">
+                <a:solidFill>
+                  <a:srgbClr val="0000FF"/>
+                </a:solidFill>
+                <a:latin typeface="Consolas" panose="020B0609020204030204" pitchFamily="49" charset="0"/>
+              </a:rPr>
+              <a:t>az</a:t>
+            </a:r>
+            <a:r>
+              <a:rPr lang="en-IE" sz="2400" dirty="0">
+                <a:solidFill>
+                  <a:srgbClr val="0000FF"/>
+                </a:solidFill>
+                <a:latin typeface="Consolas" panose="020B0609020204030204" pitchFamily="49" charset="0"/>
+              </a:rPr>
+              <a:t> </a:t>
+            </a:r>
+            <a:r>
+              <a:rPr lang="en-IE" sz="2400" dirty="0" err="1">
+                <a:solidFill>
+                  <a:srgbClr val="0000FF"/>
+                </a:solidFill>
+                <a:latin typeface="Consolas" panose="020B0609020204030204" pitchFamily="49" charset="0"/>
+              </a:rPr>
+              <a:t>acr</a:t>
+            </a:r>
+            <a:r>
+              <a:rPr lang="en-IE" sz="2400" dirty="0">
+                <a:solidFill>
+                  <a:srgbClr val="0000FF"/>
+                </a:solidFill>
+                <a:latin typeface="Consolas" panose="020B0609020204030204" pitchFamily="49" charset="0"/>
+              </a:rPr>
+              <a:t> credential show </a:t>
+            </a:r>
+            <a:r>
+              <a:rPr lang="en-IE" sz="2400" dirty="0">
+                <a:solidFill>
+                  <a:srgbClr val="000000"/>
+                </a:solidFill>
+                <a:latin typeface="Consolas" panose="020B0609020204030204" pitchFamily="49" charset="0"/>
+              </a:rPr>
+              <a:t>-n </a:t>
+            </a:r>
+            <a:r>
+              <a:rPr lang="en-IE" sz="2400" dirty="0">
+                <a:solidFill>
+                  <a:srgbClr val="A31515"/>
+                </a:solidFill>
+                <a:latin typeface="Consolas" panose="020B0609020204030204" pitchFamily="49" charset="0"/>
+              </a:rPr>
+              <a:t>TestContainerRegistry01</a:t>
+            </a:r>
+            <a:endParaRPr lang="en-IE" sz="2400" dirty="0">
+              <a:solidFill>
+                <a:srgbClr val="000000"/>
+              </a:solidFill>
+              <a:latin typeface="Consolas" panose="020B0609020204030204" pitchFamily="49" charset="0"/>
+            </a:endParaRPr>
+          </a:p>
           <a:p>
             <a:pPr marL="0" indent="0">
               <a:buNone/>
@@ -8049,7 +8259,7 @@
       </p:grpSpPr>
       <p:sp>
         <p:nvSpPr>
-          <p:cNvPr id="4" name="Title 3"/>
+          <p:cNvPr id="6" name="Title 5"/>
           <p:cNvSpPr>
             <a:spLocks noGrp="1"/>
           </p:cNvSpPr>
@@ -8057,7 +8267,12 @@
             <p:ph type="title"/>
           </p:nvPr>
         </p:nvSpPr>
-        <p:spPr/>
+        <p:spPr>
+          <a:xfrm>
+            <a:off x="331596" y="562708"/>
+            <a:ext cx="10184004" cy="713433"/>
+          </a:xfrm>
+        </p:spPr>
         <p:txBody>
           <a:bodyPr>
             <a:normAutofit/>
@@ -8067,37 +8282,465 @@
             <a:r>
               <a:rPr lang="en-GB" dirty="0">
                 <a:solidFill>
-                  <a:schemeClr val="accent1"/>
-                </a:solidFill>
-              </a:rPr>
-              <a:t>Demo</a:t>
-            </a:r>
-          </a:p>
-        </p:txBody>
-      </p:sp>
-      <p:sp>
-        <p:nvSpPr>
-          <p:cNvPr id="2" name="Text Placeholder 1"/>
-          <p:cNvSpPr>
-            <a:spLocks noGrp="1"/>
-          </p:cNvSpPr>
-          <p:nvPr>
-            <p:ph type="body" idx="1"/>
-          </p:nvPr>
-        </p:nvSpPr>
-        <p:spPr/>
-        <p:txBody>
-          <a:bodyPr/>
-          <a:lstStyle/>
-          <a:p>
-            <a:endParaRPr lang="en-GB" dirty="0"/>
+                  <a:schemeClr val="accent1">
+                    <a:lumMod val="75000"/>
+                  </a:schemeClr>
+                </a:solidFill>
+              </a:rPr>
+              <a:t>ACI – Create Container</a:t>
+            </a:r>
+          </a:p>
+        </p:txBody>
+      </p:sp>
+      <p:sp>
+        <p:nvSpPr>
+          <p:cNvPr id="3" name="Subtitle 2"/>
+          <p:cNvSpPr>
+            <a:spLocks noGrp="1"/>
+          </p:cNvSpPr>
+          <p:nvPr>
+            <p:ph idx="1"/>
+          </p:nvPr>
+        </p:nvSpPr>
+        <p:spPr>
+          <a:xfrm>
+            <a:off x="838199" y="1825625"/>
+            <a:ext cx="10973499" cy="4351338"/>
+          </a:xfrm>
+        </p:spPr>
+        <p:txBody>
+          <a:bodyPr>
+            <a:normAutofit fontScale="70000" lnSpcReduction="20000"/>
+          </a:bodyPr>
+          <a:lstStyle/>
+          <a:p>
+            <a:pPr marL="0" indent="0">
+              <a:buNone/>
+            </a:pPr>
+            <a:r>
+              <a:rPr lang="en-IE" sz="3200" dirty="0" err="1">
+                <a:solidFill>
+                  <a:srgbClr val="0000FF"/>
+                </a:solidFill>
+                <a:latin typeface="Consolas" panose="020B0609020204030204" pitchFamily="49" charset="0"/>
+              </a:rPr>
+              <a:t>az</a:t>
+            </a:r>
+            <a:r>
+              <a:rPr lang="en-IE" sz="3200" dirty="0">
+                <a:solidFill>
+                  <a:srgbClr val="0000FF"/>
+                </a:solidFill>
+                <a:latin typeface="Consolas" panose="020B0609020204030204" pitchFamily="49" charset="0"/>
+              </a:rPr>
+              <a:t> container create `</a:t>
+            </a:r>
+            <a:endParaRPr lang="en-IE" sz="3200" dirty="0">
+              <a:solidFill>
+                <a:srgbClr val="000000"/>
+              </a:solidFill>
+              <a:latin typeface="Consolas" panose="020B0609020204030204" pitchFamily="49" charset="0"/>
+            </a:endParaRPr>
+          </a:p>
+          <a:p>
+            <a:pPr marL="0" indent="0">
+              <a:buNone/>
+            </a:pPr>
+            <a:r>
+              <a:rPr lang="en-IE" sz="3200" dirty="0">
+                <a:solidFill>
+                  <a:srgbClr val="000000"/>
+                </a:solidFill>
+                <a:latin typeface="Consolas" panose="020B0609020204030204" pitchFamily="49" charset="0"/>
+              </a:rPr>
+              <a:t>  --resource-group </a:t>
+            </a:r>
+            <a:r>
+              <a:rPr lang="en-IE" sz="3200" dirty="0">
+                <a:solidFill>
+                  <a:srgbClr val="A31515"/>
+                </a:solidFill>
+                <a:latin typeface="Consolas" panose="020B0609020204030204" pitchFamily="49" charset="0"/>
+              </a:rPr>
+              <a:t>containers1 `</a:t>
+            </a:r>
+            <a:endParaRPr lang="en-IE" sz="3200" dirty="0">
+              <a:solidFill>
+                <a:srgbClr val="000000"/>
+              </a:solidFill>
+              <a:latin typeface="Consolas" panose="020B0609020204030204" pitchFamily="49" charset="0"/>
+            </a:endParaRPr>
+          </a:p>
+          <a:p>
+            <a:pPr marL="0" indent="0">
+              <a:buNone/>
+            </a:pPr>
+            <a:r>
+              <a:rPr lang="en-IE" sz="3200" dirty="0">
+                <a:solidFill>
+                  <a:srgbClr val="000000"/>
+                </a:solidFill>
+                <a:latin typeface="Consolas" panose="020B0609020204030204" pitchFamily="49" charset="0"/>
+              </a:rPr>
+              <a:t>	--image </a:t>
+            </a:r>
+            <a:r>
+              <a:rPr lang="en-IE" sz="3200" dirty="0">
+                <a:solidFill>
+                  <a:srgbClr val="A31515"/>
+                </a:solidFill>
+                <a:latin typeface="Consolas" panose="020B0609020204030204" pitchFamily="49" charset="0"/>
+              </a:rPr>
+              <a:t>testcontainerregistry01.azurecr.io/</a:t>
+            </a:r>
+            <a:r>
+              <a:rPr lang="en-IE" sz="3200" dirty="0" err="1">
+                <a:solidFill>
+                  <a:srgbClr val="A31515"/>
+                </a:solidFill>
+                <a:latin typeface="Consolas" panose="020B0609020204030204" pitchFamily="49" charset="0"/>
+              </a:rPr>
+              <a:t>devsqlimage:latest</a:t>
+            </a:r>
+            <a:r>
+              <a:rPr lang="en-IE" sz="3200" dirty="0">
+                <a:solidFill>
+                  <a:srgbClr val="A31515"/>
+                </a:solidFill>
+                <a:latin typeface="Consolas" panose="020B0609020204030204" pitchFamily="49" charset="0"/>
+              </a:rPr>
+              <a:t> `</a:t>
+            </a:r>
+            <a:endParaRPr lang="en-IE" sz="3200" dirty="0">
+              <a:solidFill>
+                <a:srgbClr val="000000"/>
+              </a:solidFill>
+              <a:latin typeface="Consolas" panose="020B0609020204030204" pitchFamily="49" charset="0"/>
+            </a:endParaRPr>
+          </a:p>
+          <a:p>
+            <a:pPr marL="0" indent="0">
+              <a:buNone/>
+            </a:pPr>
+            <a:r>
+              <a:rPr lang="en-IE" sz="3200" dirty="0">
+                <a:solidFill>
+                  <a:srgbClr val="000000"/>
+                </a:solidFill>
+                <a:latin typeface="Consolas" panose="020B0609020204030204" pitchFamily="49" charset="0"/>
+              </a:rPr>
+              <a:t>	  --registry-username </a:t>
+            </a:r>
+            <a:r>
+              <a:rPr lang="en-IE" sz="3200" i="1" dirty="0">
+                <a:solidFill>
+                  <a:srgbClr val="A31515"/>
+                </a:solidFill>
+                <a:latin typeface="Consolas" panose="020B0609020204030204" pitchFamily="49" charset="0"/>
+              </a:rPr>
+              <a:t>&lt;&lt;USERNAME&gt;&gt; </a:t>
+            </a:r>
+            <a:r>
+              <a:rPr lang="en-IE" sz="3200" dirty="0">
+                <a:solidFill>
+                  <a:srgbClr val="A31515"/>
+                </a:solidFill>
+                <a:latin typeface="Consolas" panose="020B0609020204030204" pitchFamily="49" charset="0"/>
+              </a:rPr>
+              <a:t>`</a:t>
+            </a:r>
+            <a:endParaRPr lang="en-IE" sz="3200" dirty="0">
+              <a:solidFill>
+                <a:srgbClr val="000000"/>
+              </a:solidFill>
+              <a:latin typeface="Consolas" panose="020B0609020204030204" pitchFamily="49" charset="0"/>
+            </a:endParaRPr>
+          </a:p>
+          <a:p>
+            <a:pPr marL="0" indent="0">
+              <a:buNone/>
+            </a:pPr>
+            <a:r>
+              <a:rPr lang="en-IE" sz="3200" dirty="0">
+                <a:solidFill>
+                  <a:srgbClr val="0000FF"/>
+                </a:solidFill>
+                <a:latin typeface="Consolas" panose="020B0609020204030204" pitchFamily="49" charset="0"/>
+              </a:rPr>
+              <a:t>		</a:t>
+            </a:r>
+            <a:r>
+              <a:rPr lang="en-IE" sz="3200" dirty="0">
+                <a:solidFill>
+                  <a:srgbClr val="000000"/>
+                </a:solidFill>
+                <a:latin typeface="Consolas" panose="020B0609020204030204" pitchFamily="49" charset="0"/>
+              </a:rPr>
+              <a:t>--registry-password </a:t>
+            </a:r>
+            <a:r>
+              <a:rPr lang="en-IE" sz="3200" i="1" dirty="0">
+                <a:solidFill>
+                  <a:srgbClr val="A31515"/>
+                </a:solidFill>
+                <a:latin typeface="Consolas" panose="020B0609020204030204" pitchFamily="49" charset="0"/>
+              </a:rPr>
+              <a:t>&lt;&lt;PASSWORD&gt;&gt; </a:t>
+            </a:r>
+            <a:r>
+              <a:rPr lang="en-IE" sz="3200" dirty="0">
+                <a:solidFill>
+                  <a:srgbClr val="A31515"/>
+                </a:solidFill>
+                <a:latin typeface="Consolas" panose="020B0609020204030204" pitchFamily="49" charset="0"/>
+              </a:rPr>
+              <a:t>`</a:t>
+            </a:r>
+            <a:endParaRPr lang="en-IE" sz="3200" dirty="0">
+              <a:solidFill>
+                <a:srgbClr val="000000"/>
+              </a:solidFill>
+              <a:latin typeface="Consolas" panose="020B0609020204030204" pitchFamily="49" charset="0"/>
+            </a:endParaRPr>
+          </a:p>
+          <a:p>
+            <a:pPr marL="0" indent="0">
+              <a:buNone/>
+            </a:pPr>
+            <a:r>
+              <a:rPr lang="en-IE" sz="3200" dirty="0">
+                <a:solidFill>
+                  <a:srgbClr val="0000FF"/>
+                </a:solidFill>
+                <a:latin typeface="Consolas" panose="020B0609020204030204" pitchFamily="49" charset="0"/>
+              </a:rPr>
+              <a:t>		  </a:t>
+            </a:r>
+            <a:r>
+              <a:rPr lang="en-IE" sz="3200" dirty="0">
+                <a:solidFill>
+                  <a:srgbClr val="000000"/>
+                </a:solidFill>
+                <a:latin typeface="Consolas" panose="020B0609020204030204" pitchFamily="49" charset="0"/>
+              </a:rPr>
+              <a:t>--name </a:t>
+            </a:r>
+            <a:r>
+              <a:rPr lang="en-IE" sz="3200" dirty="0">
+                <a:solidFill>
+                  <a:srgbClr val="A31515"/>
+                </a:solidFill>
+                <a:latin typeface="Consolas" panose="020B0609020204030204" pitchFamily="49" charset="0"/>
+              </a:rPr>
+              <a:t>testcontainer1 `</a:t>
+            </a:r>
+            <a:endParaRPr lang="en-IE" sz="3200" dirty="0">
+              <a:solidFill>
+                <a:srgbClr val="000000"/>
+              </a:solidFill>
+              <a:latin typeface="Consolas" panose="020B0609020204030204" pitchFamily="49" charset="0"/>
+            </a:endParaRPr>
+          </a:p>
+          <a:p>
+            <a:pPr marL="0" indent="0">
+              <a:buNone/>
+            </a:pPr>
+            <a:r>
+              <a:rPr lang="en-IE" sz="3200" dirty="0">
+                <a:solidFill>
+                  <a:srgbClr val="0000FF"/>
+                </a:solidFill>
+                <a:latin typeface="Consolas" panose="020B0609020204030204" pitchFamily="49" charset="0"/>
+              </a:rPr>
+              <a:t>		    </a:t>
+            </a:r>
+            <a:r>
+              <a:rPr lang="en-IE" sz="3200" dirty="0">
+                <a:solidFill>
+                  <a:srgbClr val="000000"/>
+                </a:solidFill>
+                <a:latin typeface="Consolas" panose="020B0609020204030204" pitchFamily="49" charset="0"/>
+              </a:rPr>
+              <a:t>--</a:t>
+            </a:r>
+            <a:r>
+              <a:rPr lang="en-IE" sz="3200" dirty="0" err="1">
+                <a:solidFill>
+                  <a:srgbClr val="000000"/>
+                </a:solidFill>
+                <a:latin typeface="Consolas" panose="020B0609020204030204" pitchFamily="49" charset="0"/>
+              </a:rPr>
+              <a:t>cpu</a:t>
+            </a:r>
+            <a:r>
+              <a:rPr lang="en-IE" sz="3200" dirty="0">
+                <a:solidFill>
+                  <a:srgbClr val="000000"/>
+                </a:solidFill>
+                <a:latin typeface="Consolas" panose="020B0609020204030204" pitchFamily="49" charset="0"/>
+              </a:rPr>
+              <a:t> </a:t>
+            </a:r>
+            <a:r>
+              <a:rPr lang="en-IE" sz="3200" dirty="0">
+                <a:solidFill>
+                  <a:srgbClr val="A31515"/>
+                </a:solidFill>
+                <a:latin typeface="Consolas" panose="020B0609020204030204" pitchFamily="49" charset="0"/>
+              </a:rPr>
+              <a:t>2 </a:t>
+            </a:r>
+            <a:r>
+              <a:rPr lang="en-IE" sz="3200" dirty="0">
+                <a:solidFill>
+                  <a:srgbClr val="000000"/>
+                </a:solidFill>
+                <a:latin typeface="Consolas" panose="020B0609020204030204" pitchFamily="49" charset="0"/>
+              </a:rPr>
+              <a:t>--memory </a:t>
+            </a:r>
+            <a:r>
+              <a:rPr lang="en-IE" sz="3200" dirty="0">
+                <a:solidFill>
+                  <a:srgbClr val="A31515"/>
+                </a:solidFill>
+                <a:latin typeface="Consolas" panose="020B0609020204030204" pitchFamily="49" charset="0"/>
+              </a:rPr>
+              <a:t>4 `</a:t>
+            </a:r>
+            <a:endParaRPr lang="en-IE" sz="3200" dirty="0">
+              <a:solidFill>
+                <a:srgbClr val="000000"/>
+              </a:solidFill>
+              <a:latin typeface="Consolas" panose="020B0609020204030204" pitchFamily="49" charset="0"/>
+            </a:endParaRPr>
+          </a:p>
+          <a:p>
+            <a:pPr marL="0" indent="0">
+              <a:buNone/>
+            </a:pPr>
+            <a:r>
+              <a:rPr lang="en-IE" sz="3200" dirty="0">
+                <a:solidFill>
+                  <a:srgbClr val="000000"/>
+                </a:solidFill>
+                <a:latin typeface="Consolas" panose="020B0609020204030204" pitchFamily="49" charset="0"/>
+              </a:rPr>
+              <a:t>--environment-variables </a:t>
+            </a:r>
+            <a:r>
+              <a:rPr lang="en-IE" sz="3200" dirty="0">
+                <a:solidFill>
+                  <a:srgbClr val="A31515"/>
+                </a:solidFill>
+                <a:latin typeface="Consolas" panose="020B0609020204030204" pitchFamily="49" charset="0"/>
+              </a:rPr>
+              <a:t>ACCEPT_EULA=Y SA_PASSWORD=Testing1122 `</a:t>
+            </a:r>
+            <a:endParaRPr lang="en-IE" sz="3200" dirty="0">
+              <a:solidFill>
+                <a:srgbClr val="000000"/>
+              </a:solidFill>
+              <a:latin typeface="Consolas" panose="020B0609020204030204" pitchFamily="49" charset="0"/>
+            </a:endParaRPr>
+          </a:p>
+          <a:p>
+            <a:pPr marL="0" indent="0">
+              <a:buNone/>
+            </a:pPr>
+            <a:r>
+              <a:rPr lang="en-IE" sz="3200" dirty="0">
+                <a:solidFill>
+                  <a:srgbClr val="000000"/>
+                </a:solidFill>
+                <a:latin typeface="Consolas" panose="020B0609020204030204" pitchFamily="49" charset="0"/>
+              </a:rPr>
+              <a:t>  --</a:t>
+            </a:r>
+            <a:r>
+              <a:rPr lang="en-IE" sz="3200" dirty="0" err="1">
+                <a:solidFill>
+                  <a:srgbClr val="000000"/>
+                </a:solidFill>
+                <a:latin typeface="Consolas" panose="020B0609020204030204" pitchFamily="49" charset="0"/>
+              </a:rPr>
+              <a:t>ip</a:t>
+            </a:r>
+            <a:r>
+              <a:rPr lang="en-IE" sz="3200" dirty="0">
+                <a:solidFill>
+                  <a:srgbClr val="000000"/>
+                </a:solidFill>
+                <a:latin typeface="Consolas" panose="020B0609020204030204" pitchFamily="49" charset="0"/>
+              </a:rPr>
+              <a:t>-address </a:t>
+            </a:r>
+            <a:r>
+              <a:rPr lang="en-IE" sz="3200" dirty="0">
+                <a:solidFill>
+                  <a:srgbClr val="A31515"/>
+                </a:solidFill>
+                <a:latin typeface="Consolas" panose="020B0609020204030204" pitchFamily="49" charset="0"/>
+              </a:rPr>
+              <a:t>public `</a:t>
+            </a:r>
+            <a:endParaRPr lang="en-IE" sz="3200" dirty="0">
+              <a:solidFill>
+                <a:srgbClr val="000000"/>
+              </a:solidFill>
+              <a:latin typeface="Consolas" panose="020B0609020204030204" pitchFamily="49" charset="0"/>
+            </a:endParaRPr>
+          </a:p>
+          <a:p>
+            <a:pPr marL="0" indent="0">
+              <a:buNone/>
+            </a:pPr>
+            <a:r>
+              <a:rPr lang="en-IE" sz="3200" dirty="0">
+                <a:solidFill>
+                  <a:srgbClr val="0000FF"/>
+                </a:solidFill>
+                <a:latin typeface="Consolas" panose="020B0609020204030204" pitchFamily="49" charset="0"/>
+              </a:rPr>
+              <a:t>	</a:t>
+            </a:r>
+            <a:r>
+              <a:rPr lang="en-IE" sz="3200" dirty="0">
+                <a:solidFill>
+                  <a:srgbClr val="000000"/>
+                </a:solidFill>
+                <a:latin typeface="Consolas" panose="020B0609020204030204" pitchFamily="49" charset="0"/>
+              </a:rPr>
+              <a:t>--ports </a:t>
+            </a:r>
+            <a:r>
+              <a:rPr lang="en-IE" sz="3200" dirty="0">
+                <a:solidFill>
+                  <a:srgbClr val="A31515"/>
+                </a:solidFill>
+                <a:latin typeface="Consolas" panose="020B0609020204030204" pitchFamily="49" charset="0"/>
+              </a:rPr>
+              <a:t>1433</a:t>
+            </a:r>
+            <a:endParaRPr lang="en-IE" sz="3200" dirty="0">
+              <a:solidFill>
+                <a:srgbClr val="000000"/>
+              </a:solidFill>
+              <a:latin typeface="Consolas" panose="020B0609020204030204" pitchFamily="49" charset="0"/>
+            </a:endParaRPr>
+          </a:p>
+          <a:p>
+            <a:pPr marL="0" indent="0">
+              <a:buNone/>
+            </a:pPr>
+            <a:endParaRPr lang="en-GB" sz="3200" dirty="0"/>
           </a:p>
         </p:txBody>
       </p:sp>
     </p:spTree>
     <p:extLst>
       <p:ext uri="{BB962C8B-B14F-4D97-AF65-F5344CB8AC3E}">
-        <p14:creationId xmlns:p14="http://schemas.microsoft.com/office/powerpoint/2010/main" val="2367277479"/>
+        <p14:creationId xmlns:p14="http://schemas.microsoft.com/office/powerpoint/2010/main" val="29742966"/>
       </p:ext>
     </p:extLst>
   </p:cSld>
@@ -8126,7 +8769,7 @@
       </p:grpSpPr>
       <p:sp>
         <p:nvSpPr>
-          <p:cNvPr id="4" name="Title 3"/>
+          <p:cNvPr id="6" name="Title 5"/>
           <p:cNvSpPr>
             <a:spLocks noGrp="1"/>
           </p:cNvSpPr>
@@ -8134,7 +8777,12 @@
             <p:ph type="title"/>
           </p:nvPr>
         </p:nvSpPr>
-        <p:spPr/>
+        <p:spPr>
+          <a:xfrm>
+            <a:off x="0" y="0"/>
+            <a:ext cx="10184004" cy="713433"/>
+          </a:xfrm>
+        </p:spPr>
         <p:txBody>
           <a:bodyPr>
             <a:normAutofit/>
@@ -8144,37 +8792,155 @@
             <a:r>
               <a:rPr lang="en-GB" dirty="0">
                 <a:solidFill>
-                  <a:schemeClr val="accent1"/>
-                </a:solidFill>
-              </a:rPr>
-              <a:t>Azure Container Services</a:t>
-            </a:r>
-          </a:p>
-        </p:txBody>
-      </p:sp>
-      <p:sp>
-        <p:nvSpPr>
-          <p:cNvPr id="2" name="Text Placeholder 1"/>
-          <p:cNvSpPr>
-            <a:spLocks noGrp="1"/>
-          </p:cNvSpPr>
-          <p:nvPr>
-            <p:ph type="body" idx="1"/>
-          </p:nvPr>
-        </p:nvSpPr>
-        <p:spPr/>
-        <p:txBody>
-          <a:bodyPr/>
-          <a:lstStyle/>
-          <a:p>
-            <a:endParaRPr lang="en-GB" dirty="0"/>
-          </a:p>
-        </p:txBody>
-      </p:sp>
+                  <a:schemeClr val="accent1">
+                    <a:lumMod val="75000"/>
+                  </a:schemeClr>
+                </a:solidFill>
+              </a:rPr>
+              <a:t>ACI – Get Container Status</a:t>
+            </a:r>
+          </a:p>
+        </p:txBody>
+      </p:sp>
+      <p:sp>
+        <p:nvSpPr>
+          <p:cNvPr id="4" name="TextBox 3">
+            <a:extLst>
+              <a:ext uri="{FF2B5EF4-FFF2-40B4-BE49-F238E27FC236}">
+                <a16:creationId xmlns:a16="http://schemas.microsoft.com/office/drawing/2014/main" id="{9978C84C-679C-4CDF-B0B0-5E115D1CC1F1}"/>
+              </a:ext>
+            </a:extLst>
+          </p:cNvPr>
+          <p:cNvSpPr txBox="1"/>
+          <p:nvPr/>
+        </p:nvSpPr>
+        <p:spPr>
+          <a:xfrm>
+            <a:off x="419450" y="3112315"/>
+            <a:ext cx="4840448" cy="923330"/>
+          </a:xfrm>
+          <a:prstGeom prst="rect">
+            <a:avLst/>
+          </a:prstGeom>
+          <a:noFill/>
+        </p:spPr>
+        <p:txBody>
+          <a:bodyPr wrap="square" rtlCol="0">
+            <a:spAutoFit/>
+          </a:bodyPr>
+          <a:lstStyle/>
+          <a:p>
+            <a:r>
+              <a:rPr lang="en-US" dirty="0" err="1">
+                <a:solidFill>
+                  <a:srgbClr val="0000FF"/>
+                </a:solidFill>
+                <a:latin typeface="Consolas" panose="020B0609020204030204" pitchFamily="49" charset="0"/>
+              </a:rPr>
+              <a:t>az</a:t>
+            </a:r>
+            <a:r>
+              <a:rPr lang="en-US" dirty="0">
+                <a:solidFill>
+                  <a:srgbClr val="0000FF"/>
+                </a:solidFill>
+                <a:latin typeface="Consolas" panose="020B0609020204030204" pitchFamily="49" charset="0"/>
+              </a:rPr>
+              <a:t> container show `</a:t>
+            </a:r>
+          </a:p>
+          <a:p>
+            <a:r>
+              <a:rPr lang="en-US" dirty="0">
+                <a:solidFill>
+                  <a:srgbClr val="0000FF"/>
+                </a:solidFill>
+                <a:latin typeface="Consolas" panose="020B0609020204030204" pitchFamily="49" charset="0"/>
+              </a:rPr>
+              <a:t>  </a:t>
+            </a:r>
+            <a:r>
+              <a:rPr lang="en-US" dirty="0">
+                <a:solidFill>
+                  <a:srgbClr val="000000"/>
+                </a:solidFill>
+                <a:latin typeface="Consolas" panose="020B0609020204030204" pitchFamily="49" charset="0"/>
+              </a:rPr>
+              <a:t>--name </a:t>
+            </a:r>
+            <a:r>
+              <a:rPr lang="en-US" dirty="0">
+                <a:solidFill>
+                  <a:srgbClr val="A31515"/>
+                </a:solidFill>
+                <a:latin typeface="Consolas" panose="020B0609020204030204" pitchFamily="49" charset="0"/>
+              </a:rPr>
+              <a:t>testcontainer1 </a:t>
+            </a:r>
+          </a:p>
+          <a:p>
+            <a:r>
+              <a:rPr lang="en-US" dirty="0">
+                <a:solidFill>
+                  <a:srgbClr val="000000"/>
+                </a:solidFill>
+                <a:latin typeface="Consolas" panose="020B0609020204030204" pitchFamily="49" charset="0"/>
+              </a:rPr>
+              <a:t>	--resource-group </a:t>
+            </a:r>
+            <a:r>
+              <a:rPr lang="en-US" dirty="0">
+                <a:solidFill>
+                  <a:srgbClr val="A31515"/>
+                </a:solidFill>
+                <a:latin typeface="Consolas" panose="020B0609020204030204" pitchFamily="49" charset="0"/>
+              </a:rPr>
+              <a:t>containers1</a:t>
+            </a:r>
+            <a:endParaRPr lang="en-US" b="0" dirty="0">
+              <a:solidFill>
+                <a:srgbClr val="000000"/>
+              </a:solidFill>
+              <a:effectLst/>
+              <a:latin typeface="Consolas" panose="020B0609020204030204" pitchFamily="49" charset="0"/>
+            </a:endParaRPr>
+          </a:p>
+        </p:txBody>
+      </p:sp>
+      <p:pic>
+        <p:nvPicPr>
+          <p:cNvPr id="11" name="Picture 10">
+            <a:extLst>
+              <a:ext uri="{FF2B5EF4-FFF2-40B4-BE49-F238E27FC236}">
+                <a16:creationId xmlns:a16="http://schemas.microsoft.com/office/drawing/2014/main" id="{923D0EAD-F838-4D55-BBD0-F9AF2765E16D}"/>
+              </a:ext>
+            </a:extLst>
+          </p:cNvPr>
+          <p:cNvPicPr>
+            <a:picLocks noChangeAspect="1"/>
+          </p:cNvPicPr>
+          <p:nvPr/>
+        </p:nvPicPr>
+        <p:blipFill>
+          <a:blip r:embed="rId2"/>
+          <a:stretch>
+            <a:fillRect/>
+          </a:stretch>
+        </p:blipFill>
+        <p:spPr>
+          <a:xfrm>
+            <a:off x="5240403" y="758799"/>
+            <a:ext cx="6820117" cy="5743601"/>
+          </a:xfrm>
+          <a:prstGeom prst="rect">
+            <a:avLst/>
+          </a:prstGeom>
+        </p:spPr>
+      </p:pic>
     </p:spTree>
     <p:extLst>
       <p:ext uri="{BB962C8B-B14F-4D97-AF65-F5344CB8AC3E}">
-        <p14:creationId xmlns:p14="http://schemas.microsoft.com/office/powerpoint/2010/main" val="1710832568"/>
+        <p14:creationId xmlns:p14="http://schemas.microsoft.com/office/powerpoint/2010/main" val="4260913970"/>
       </p:ext>
     </p:extLst>
   </p:cSld>
@@ -8231,84 +8997,47 @@
                   </a:schemeClr>
                 </a:solidFill>
               </a:rPr>
-              <a:t>Azure Container Services</a:t>
-            </a:r>
-          </a:p>
-        </p:txBody>
-      </p:sp>
-      <p:sp>
-        <p:nvSpPr>
-          <p:cNvPr id="3" name="Subtitle 2"/>
-          <p:cNvSpPr>
-            <a:spLocks noGrp="1"/>
-          </p:cNvSpPr>
+              <a:t>ACI – Connect to SQL Server</a:t>
+            </a:r>
+          </a:p>
+        </p:txBody>
+      </p:sp>
+      <p:pic>
+        <p:nvPicPr>
+          <p:cNvPr id="2" name="Content Placeholder 1">
+            <a:extLst>
+              <a:ext uri="{FF2B5EF4-FFF2-40B4-BE49-F238E27FC236}">
+                <a16:creationId xmlns:a16="http://schemas.microsoft.com/office/drawing/2014/main" id="{D66A7EA8-088A-4CED-9AD6-2AF9B163DAAE}"/>
+              </a:ext>
+            </a:extLst>
+          </p:cNvPr>
+          <p:cNvPicPr>
+            <a:picLocks noGrp="1" noChangeAspect="1"/>
+          </p:cNvPicPr>
           <p:nvPr>
             <p:ph idx="1"/>
           </p:nvPr>
-        </p:nvSpPr>
-        <p:spPr/>
-        <p:txBody>
-          <a:bodyPr>
-            <a:normAutofit/>
-          </a:bodyPr>
-          <a:lstStyle/>
-          <a:p>
-            <a:pPr marL="0" indent="0">
-              <a:buNone/>
-            </a:pPr>
-            <a:r>
-              <a:rPr lang="en-GB" sz="3200" dirty="0"/>
-              <a:t>Two flavours</a:t>
-            </a:r>
-          </a:p>
-          <a:p>
-            <a:pPr marL="0" indent="0">
-              <a:buNone/>
-            </a:pPr>
-            <a:r>
-              <a:rPr lang="en-GB" sz="3200" dirty="0"/>
-              <a:t>	Azure Container Services (ACS)</a:t>
-            </a:r>
-          </a:p>
-          <a:p>
-            <a:pPr marL="0" indent="0">
-              <a:buNone/>
-            </a:pPr>
-            <a:r>
-              <a:rPr lang="en-GB" sz="3200" dirty="0"/>
-              <a:t>	Azure Container Service (AKS)</a:t>
-            </a:r>
-          </a:p>
-          <a:p>
-            <a:pPr marL="0" indent="0">
-              <a:buNone/>
-            </a:pPr>
-            <a:endParaRPr lang="en-GB" sz="3200" dirty="0"/>
-          </a:p>
-          <a:p>
-            <a:pPr marL="0" indent="0">
-              <a:buNone/>
-            </a:pPr>
-            <a:r>
-              <a:rPr lang="en-GB" sz="3200" dirty="0"/>
-              <a:t>ACS provides container hosting using DC/OS, Swarm, or K8s</a:t>
-            </a:r>
-          </a:p>
-          <a:p>
-            <a:pPr marL="0" indent="0">
-              <a:buNone/>
-            </a:pPr>
-            <a:r>
-              <a:rPr lang="en-GB" sz="3200" dirty="0"/>
-              <a:t>AKS is specifically built to implement Kubernetes</a:t>
-            </a:r>
-          </a:p>
-        </p:txBody>
-      </p:sp>
+        </p:nvPicPr>
+        <p:blipFill>
+          <a:blip r:embed="rId2"/>
+          <a:stretch>
+            <a:fillRect/>
+          </a:stretch>
+        </p:blipFill>
+        <p:spPr>
+          <a:xfrm>
+            <a:off x="573596" y="1711624"/>
+            <a:ext cx="11147271" cy="3925778"/>
+          </a:xfrm>
+          <a:prstGeom prst="rect">
+            <a:avLst/>
+          </a:prstGeom>
+        </p:spPr>
+      </p:pic>
     </p:spTree>
     <p:extLst>
       <p:ext uri="{BB962C8B-B14F-4D97-AF65-F5344CB8AC3E}">
-        <p14:creationId xmlns:p14="http://schemas.microsoft.com/office/powerpoint/2010/main" val="3974016028"/>
+        <p14:creationId xmlns:p14="http://schemas.microsoft.com/office/powerpoint/2010/main" val="2662282580"/>
       </p:ext>
     </p:extLst>
   </p:cSld>
@@ -8337,7 +9066,7 @@
       </p:grpSpPr>
       <p:sp>
         <p:nvSpPr>
-          <p:cNvPr id="6" name="Title 5"/>
+          <p:cNvPr id="4" name="Title 3"/>
           <p:cNvSpPr>
             <a:spLocks noGrp="1"/>
           </p:cNvSpPr>
@@ -8345,12 +9074,7 @@
             <p:ph type="title"/>
           </p:nvPr>
         </p:nvSpPr>
-        <p:spPr>
-          <a:xfrm>
-            <a:off x="331596" y="562708"/>
-            <a:ext cx="10184004" cy="713433"/>
-          </a:xfrm>
-        </p:spPr>
+        <p:spPr/>
         <p:txBody>
           <a:bodyPr>
             <a:normAutofit/>
@@ -8360,88 +9084,37 @@
             <a:r>
               <a:rPr lang="en-GB" dirty="0">
                 <a:solidFill>
-                  <a:schemeClr val="accent1">
-                    <a:lumMod val="75000"/>
-                  </a:schemeClr>
-                </a:solidFill>
-              </a:rPr>
-              <a:t>Kubernetes</a:t>
-            </a:r>
-          </a:p>
-        </p:txBody>
-      </p:sp>
-      <p:sp>
-        <p:nvSpPr>
-          <p:cNvPr id="3" name="Subtitle 2"/>
-          <p:cNvSpPr>
-            <a:spLocks noGrp="1"/>
-          </p:cNvSpPr>
-          <p:nvPr>
-            <p:ph idx="1"/>
+                  <a:schemeClr val="accent1"/>
+                </a:solidFill>
+              </a:rPr>
+              <a:t>Demo</a:t>
+            </a:r>
+          </a:p>
+        </p:txBody>
+      </p:sp>
+      <p:sp>
+        <p:nvSpPr>
+          <p:cNvPr id="2" name="Text Placeholder 1"/>
+          <p:cNvSpPr>
+            <a:spLocks noGrp="1"/>
+          </p:cNvSpPr>
+          <p:nvPr>
+            <p:ph type="body" idx="1"/>
           </p:nvPr>
         </p:nvSpPr>
         <p:spPr/>
         <p:txBody>
-          <a:bodyPr>
-            <a:normAutofit/>
-          </a:bodyPr>
-          <a:lstStyle/>
-          <a:p>
-            <a:pPr marL="0" indent="0">
-              <a:buNone/>
-            </a:pPr>
-            <a:r>
-              <a:rPr lang="en-GB" sz="3200" dirty="0"/>
-              <a:t>Open Source system for managing containers</a:t>
-            </a:r>
-          </a:p>
-          <a:p>
-            <a:pPr marL="0" indent="0">
-              <a:buNone/>
-            </a:pPr>
-            <a:r>
-              <a:rPr lang="en-GB" sz="3200" dirty="0"/>
-              <a:t>Deployed as a cluster containing a master and multiple nodes</a:t>
-            </a:r>
-          </a:p>
-          <a:p>
-            <a:pPr marL="0" indent="0">
-              <a:buNone/>
-            </a:pPr>
-            <a:r>
-              <a:rPr lang="en-GB" sz="3200" dirty="0"/>
-              <a:t>Pods hold containers running on the nodes</a:t>
-            </a:r>
-          </a:p>
-          <a:p>
-            <a:pPr marL="0" indent="0">
-              <a:buNone/>
-            </a:pPr>
-            <a:r>
-              <a:rPr lang="en-GB" sz="3200" dirty="0"/>
-              <a:t>Services define/allow access to sets of pods</a:t>
-            </a:r>
-          </a:p>
-          <a:p>
-            <a:pPr marL="0" indent="0">
-              <a:buNone/>
-            </a:pPr>
-            <a:r>
-              <a:rPr lang="en-GB" sz="3200" dirty="0"/>
-              <a:t>Deployments created and managed via </a:t>
-            </a:r>
-            <a:r>
-              <a:rPr lang="en-GB" sz="3200" dirty="0" err="1"/>
-              <a:t>Kubectl</a:t>
-            </a:r>
-            <a:endParaRPr lang="en-GB" sz="3200" dirty="0"/>
+          <a:bodyPr/>
+          <a:lstStyle/>
+          <a:p>
+            <a:endParaRPr lang="en-GB" dirty="0"/>
           </a:p>
         </p:txBody>
       </p:sp>
     </p:spTree>
     <p:extLst>
       <p:ext uri="{BB962C8B-B14F-4D97-AF65-F5344CB8AC3E}">
-        <p14:creationId xmlns:p14="http://schemas.microsoft.com/office/powerpoint/2010/main" val="1834450055"/>
+        <p14:creationId xmlns:p14="http://schemas.microsoft.com/office/powerpoint/2010/main" val="2367277479"/>
       </p:ext>
     </p:extLst>
   </p:cSld>
@@ -8470,7 +9143,7 @@
       </p:grpSpPr>
       <p:sp>
         <p:nvSpPr>
-          <p:cNvPr id="6" name="Title 5"/>
+          <p:cNvPr id="4" name="Title 3"/>
           <p:cNvSpPr>
             <a:spLocks noGrp="1"/>
           </p:cNvSpPr>
@@ -8478,12 +9151,7 @@
             <p:ph type="title"/>
           </p:nvPr>
         </p:nvSpPr>
-        <p:spPr>
-          <a:xfrm>
-            <a:off x="331596" y="562708"/>
-            <a:ext cx="10184004" cy="713433"/>
-          </a:xfrm>
-        </p:spPr>
+        <p:spPr/>
         <p:txBody>
           <a:bodyPr>
             <a:normAutofit/>
@@ -8493,95 +9161,37 @@
             <a:r>
               <a:rPr lang="en-GB" dirty="0">
                 <a:solidFill>
-                  <a:schemeClr val="accent1">
-                    <a:lumMod val="75000"/>
-                  </a:schemeClr>
-                </a:solidFill>
-              </a:rPr>
-              <a:t>Azure Container Services (AKS)</a:t>
-            </a:r>
-          </a:p>
-        </p:txBody>
-      </p:sp>
-      <p:sp>
-        <p:nvSpPr>
-          <p:cNvPr id="3" name="Subtitle 2"/>
-          <p:cNvSpPr>
-            <a:spLocks noGrp="1"/>
-          </p:cNvSpPr>
-          <p:nvPr>
-            <p:ph idx="1"/>
+                  <a:schemeClr val="accent1"/>
+                </a:solidFill>
+              </a:rPr>
+              <a:t>Azure Container Services</a:t>
+            </a:r>
+          </a:p>
+        </p:txBody>
+      </p:sp>
+      <p:sp>
+        <p:nvSpPr>
+          <p:cNvPr id="2" name="Text Placeholder 1"/>
+          <p:cNvSpPr>
+            <a:spLocks noGrp="1"/>
+          </p:cNvSpPr>
+          <p:nvPr>
+            <p:ph type="body" idx="1"/>
           </p:nvPr>
         </p:nvSpPr>
         <p:spPr/>
         <p:txBody>
-          <a:bodyPr>
-            <a:normAutofit/>
-          </a:bodyPr>
-          <a:lstStyle/>
-          <a:p>
-            <a:pPr marL="0" indent="0">
-              <a:buNone/>
-            </a:pPr>
-            <a:r>
-              <a:rPr lang="en-GB" sz="3200" dirty="0"/>
-              <a:t>Simplifies deployment of Kubernetes clusters in Azure</a:t>
-            </a:r>
-          </a:p>
-          <a:p>
-            <a:pPr marL="0" indent="0">
-              <a:buNone/>
-            </a:pPr>
-            <a:r>
-              <a:rPr lang="en-GB" sz="3200" dirty="0"/>
-              <a:t>Cluster can be spun up with one line of code</a:t>
-            </a:r>
-          </a:p>
-          <a:p>
-            <a:pPr marL="0" indent="0">
-              <a:buNone/>
-            </a:pPr>
-            <a:r>
-              <a:rPr lang="en-GB" sz="3200" dirty="0"/>
-              <a:t>Applications deployed to cluster via </a:t>
-            </a:r>
-            <a:r>
-              <a:rPr lang="en-GB" sz="3200" dirty="0" err="1"/>
-              <a:t>yaml</a:t>
-            </a:r>
-            <a:r>
-              <a:rPr lang="en-GB" sz="3200" dirty="0"/>
-              <a:t> files</a:t>
-            </a:r>
-          </a:p>
-          <a:p>
-            <a:pPr marL="0" indent="0">
-              <a:buNone/>
-            </a:pPr>
-            <a:r>
-              <a:rPr lang="en-GB" sz="3200" dirty="0"/>
-              <a:t>Managed by Azure-CLI/</a:t>
-            </a:r>
-            <a:r>
-              <a:rPr lang="en-GB" sz="3200" dirty="0" err="1"/>
-              <a:t>powershell</a:t>
-            </a:r>
-            <a:r>
-              <a:rPr lang="en-GB" sz="3200" dirty="0"/>
-              <a:t> and </a:t>
-            </a:r>
-            <a:r>
-              <a:rPr lang="en-GB" sz="3200" dirty="0" err="1"/>
-              <a:t>kubectl</a:t>
-            </a:r>
-            <a:endParaRPr lang="en-GB" sz="3200" dirty="0"/>
+          <a:bodyPr/>
+          <a:lstStyle/>
+          <a:p>
+            <a:endParaRPr lang="en-GB" dirty="0"/>
           </a:p>
         </p:txBody>
       </p:sp>
     </p:spTree>
     <p:extLst>
       <p:ext uri="{BB962C8B-B14F-4D97-AF65-F5344CB8AC3E}">
-        <p14:creationId xmlns:p14="http://schemas.microsoft.com/office/powerpoint/2010/main" val="3069965736"/>
+        <p14:creationId xmlns:p14="http://schemas.microsoft.com/office/powerpoint/2010/main" val="1710832568"/>
       </p:ext>
     </p:extLst>
   </p:cSld>
@@ -8610,7 +9220,7 @@
       </p:grpSpPr>
       <p:sp>
         <p:nvSpPr>
-          <p:cNvPr id="4" name="Title 3"/>
+          <p:cNvPr id="6" name="Title 5"/>
           <p:cNvSpPr>
             <a:spLocks noGrp="1"/>
           </p:cNvSpPr>
@@ -8618,7 +9228,12 @@
             <p:ph type="title"/>
           </p:nvPr>
         </p:nvSpPr>
-        <p:spPr/>
+        <p:spPr>
+          <a:xfrm>
+            <a:off x="331596" y="562708"/>
+            <a:ext cx="10184004" cy="713433"/>
+          </a:xfrm>
+        </p:spPr>
         <p:txBody>
           <a:bodyPr>
             <a:normAutofit/>
@@ -8628,37 +9243,89 @@
             <a:r>
               <a:rPr lang="en-GB" dirty="0">
                 <a:solidFill>
-                  <a:schemeClr val="accent1"/>
-                </a:solidFill>
-              </a:rPr>
-              <a:t>Demo</a:t>
-            </a:r>
-          </a:p>
-        </p:txBody>
-      </p:sp>
-      <p:sp>
-        <p:nvSpPr>
-          <p:cNvPr id="2" name="Text Placeholder 1"/>
-          <p:cNvSpPr>
-            <a:spLocks noGrp="1"/>
-          </p:cNvSpPr>
-          <p:nvPr>
-            <p:ph type="body" idx="1"/>
+                  <a:schemeClr val="accent1">
+                    <a:lumMod val="75000"/>
+                  </a:schemeClr>
+                </a:solidFill>
+              </a:rPr>
+              <a:t>Azure Container Services</a:t>
+            </a:r>
+          </a:p>
+        </p:txBody>
+      </p:sp>
+      <p:sp>
+        <p:nvSpPr>
+          <p:cNvPr id="3" name="Subtitle 2"/>
+          <p:cNvSpPr>
+            <a:spLocks noGrp="1"/>
+          </p:cNvSpPr>
+          <p:nvPr>
+            <p:ph idx="1"/>
           </p:nvPr>
         </p:nvSpPr>
         <p:spPr/>
         <p:txBody>
-          <a:bodyPr/>
-          <a:lstStyle/>
-          <a:p>
-            <a:endParaRPr lang="en-GB" dirty="0"/>
+          <a:bodyPr>
+            <a:normAutofit/>
+          </a:bodyPr>
+          <a:lstStyle/>
+          <a:p>
+            <a:pPr marL="0" indent="0">
+              <a:buNone/>
+            </a:pPr>
+            <a:r>
+              <a:rPr lang="en-GB" sz="3200" dirty="0"/>
+              <a:t>Two flavours</a:t>
+            </a:r>
+          </a:p>
+          <a:p>
+            <a:pPr marL="0" indent="0">
+              <a:buNone/>
+            </a:pPr>
+            <a:r>
+              <a:rPr lang="en-GB" sz="3200" dirty="0"/>
+              <a:t>	Azure Container Services (ACS)</a:t>
+            </a:r>
+          </a:p>
+          <a:p>
+            <a:pPr marL="0" indent="0">
+              <a:buNone/>
+            </a:pPr>
+            <a:r>
+              <a:rPr lang="en-GB" sz="3200" dirty="0"/>
+              <a:t>	Azure Container Service (AKS)</a:t>
+            </a:r>
+          </a:p>
+          <a:p>
+            <a:pPr marL="0" indent="0">
+              <a:buNone/>
+            </a:pPr>
+            <a:endParaRPr lang="en-GB" sz="3200" dirty="0"/>
+          </a:p>
+          <a:p>
+            <a:pPr marL="0" indent="0">
+              <a:buNone/>
+            </a:pPr>
+            <a:r>
+              <a:rPr lang="en-GB" sz="3200" dirty="0"/>
+              <a:t>ACS provides container hosting using DC/OS, Swarm, or K8s</a:t>
+            </a:r>
+          </a:p>
+          <a:p>
+            <a:pPr marL="0" indent="0">
+              <a:buNone/>
+            </a:pPr>
+            <a:r>
+              <a:rPr lang="en-GB" sz="3200" dirty="0"/>
+              <a:t>AKS is specifically built to implement Kubernetes</a:t>
+            </a:r>
           </a:p>
         </p:txBody>
       </p:sp>
     </p:spTree>
     <p:extLst>
       <p:ext uri="{BB962C8B-B14F-4D97-AF65-F5344CB8AC3E}">
-        <p14:creationId xmlns:p14="http://schemas.microsoft.com/office/powerpoint/2010/main" val="2917938358"/>
+        <p14:creationId xmlns:p14="http://schemas.microsoft.com/office/powerpoint/2010/main" val="3974016028"/>
       </p:ext>
     </p:extLst>
   </p:cSld>
@@ -8687,7 +9354,7 @@
       </p:grpSpPr>
       <p:sp>
         <p:nvSpPr>
-          <p:cNvPr id="4" name="Title 3"/>
+          <p:cNvPr id="6" name="Title 5"/>
           <p:cNvSpPr>
             <a:spLocks noGrp="1"/>
           </p:cNvSpPr>
@@ -8695,7 +9362,12 @@
             <p:ph type="title"/>
           </p:nvPr>
         </p:nvSpPr>
-        <p:spPr/>
+        <p:spPr>
+          <a:xfrm>
+            <a:off x="331596" y="562708"/>
+            <a:ext cx="10184004" cy="713433"/>
+          </a:xfrm>
+        </p:spPr>
         <p:txBody>
           <a:bodyPr>
             <a:normAutofit/>
@@ -8705,50 +9377,88 @@
             <a:r>
               <a:rPr lang="en-GB" dirty="0">
                 <a:solidFill>
-                  <a:schemeClr val="accent1"/>
-                </a:solidFill>
-              </a:rPr>
-              <a:t>Docker EE for </a:t>
-            </a:r>
-            <a:r>
-              <a:rPr lang="en-GB" dirty="0" err="1">
-                <a:solidFill>
-                  <a:schemeClr val="accent1"/>
-                </a:solidFill>
-              </a:rPr>
-              <a:t>Azuzre</a:t>
-            </a:r>
-            <a:endParaRPr lang="en-GB" dirty="0">
-              <a:solidFill>
-                <a:schemeClr val="accent1"/>
-              </a:solidFill>
-            </a:endParaRPr>
-          </a:p>
-        </p:txBody>
-      </p:sp>
-      <p:sp>
-        <p:nvSpPr>
-          <p:cNvPr id="2" name="Text Placeholder 1"/>
-          <p:cNvSpPr>
-            <a:spLocks noGrp="1"/>
-          </p:cNvSpPr>
-          <p:nvPr>
-            <p:ph type="body" idx="1"/>
+                  <a:schemeClr val="accent1">
+                    <a:lumMod val="75000"/>
+                  </a:schemeClr>
+                </a:solidFill>
+              </a:rPr>
+              <a:t>Kubernetes</a:t>
+            </a:r>
+          </a:p>
+        </p:txBody>
+      </p:sp>
+      <p:sp>
+        <p:nvSpPr>
+          <p:cNvPr id="3" name="Subtitle 2"/>
+          <p:cNvSpPr>
+            <a:spLocks noGrp="1"/>
+          </p:cNvSpPr>
+          <p:nvPr>
+            <p:ph idx="1"/>
           </p:nvPr>
         </p:nvSpPr>
         <p:spPr/>
         <p:txBody>
-          <a:bodyPr/>
-          <a:lstStyle/>
-          <a:p>
-            <a:endParaRPr lang="en-GB" dirty="0"/>
+          <a:bodyPr>
+            <a:normAutofit/>
+          </a:bodyPr>
+          <a:lstStyle/>
+          <a:p>
+            <a:pPr marL="0" indent="0">
+              <a:buNone/>
+            </a:pPr>
+            <a:r>
+              <a:rPr lang="en-GB" sz="3200" dirty="0"/>
+              <a:t>Open Source system for managing containers</a:t>
+            </a:r>
+          </a:p>
+          <a:p>
+            <a:pPr marL="0" indent="0">
+              <a:buNone/>
+            </a:pPr>
+            <a:r>
+              <a:rPr lang="en-GB" sz="3200" dirty="0"/>
+              <a:t>Deployed as a cluster containing a master and multiple nodes</a:t>
+            </a:r>
+          </a:p>
+          <a:p>
+            <a:pPr marL="0" indent="0">
+              <a:buNone/>
+            </a:pPr>
+            <a:r>
+              <a:rPr lang="en-GB" sz="3200" dirty="0"/>
+              <a:t>Pods hold containers running on the nodes</a:t>
+            </a:r>
+          </a:p>
+          <a:p>
+            <a:pPr marL="0" indent="0">
+              <a:buNone/>
+            </a:pPr>
+            <a:r>
+              <a:rPr lang="en-GB" sz="3200" dirty="0"/>
+              <a:t>Services define/allow access to sets of pods</a:t>
+            </a:r>
+          </a:p>
+          <a:p>
+            <a:pPr marL="0" indent="0">
+              <a:buNone/>
+            </a:pPr>
+            <a:r>
+              <a:rPr lang="en-GB" sz="3200" dirty="0"/>
+              <a:t>Deployments created and managed via </a:t>
+            </a:r>
+            <a:r>
+              <a:rPr lang="en-GB" sz="3200" dirty="0" err="1"/>
+              <a:t>Kubectl</a:t>
+            </a:r>
+            <a:endParaRPr lang="en-GB" sz="3200" dirty="0"/>
           </a:p>
         </p:txBody>
       </p:sp>
     </p:spTree>
     <p:extLst>
       <p:ext uri="{BB962C8B-B14F-4D97-AF65-F5344CB8AC3E}">
-        <p14:creationId xmlns:p14="http://schemas.microsoft.com/office/powerpoint/2010/main" val="3610026559"/>
+        <p14:creationId xmlns:p14="http://schemas.microsoft.com/office/powerpoint/2010/main" val="1834450055"/>
       </p:ext>
     </p:extLst>
   </p:cSld>
@@ -8805,7 +9515,7 @@
                   </a:schemeClr>
                 </a:solidFill>
               </a:rPr>
-              <a:t>Docker EE for Azure</a:t>
+              <a:t>Azure Container Services (AKS)</a:t>
             </a:r>
           </a:p>
         </p:txBody>
@@ -8831,17 +9541,56 @@
               <a:buNone/>
             </a:pPr>
             <a:r>
-              <a:rPr lang="en-GB" sz="3200" dirty="0">
-                <a:hlinkClick r:id="rId2"/>
-              </a:rPr>
-              <a:t>https://store.docker.com/editions/enterprise/docker-ee-azure</a:t>
-            </a:r>
-            <a:endParaRPr lang="en-GB" sz="3200" dirty="0"/>
+              <a:rPr lang="en-GB" sz="3200" dirty="0"/>
+              <a:t>Simplifies deployment of Kubernetes clusters in Azure</a:t>
+            </a:r>
           </a:p>
           <a:p>
             <a:pPr marL="0" indent="0">
               <a:buNone/>
             </a:pPr>
+            <a:r>
+              <a:rPr lang="en-GB" sz="3200" dirty="0"/>
+              <a:t>Cluster can be spun up with one line of code</a:t>
+            </a:r>
+          </a:p>
+          <a:p>
+            <a:pPr marL="0" indent="0">
+              <a:buNone/>
+            </a:pPr>
+            <a:r>
+              <a:rPr lang="en-GB" sz="3200" dirty="0"/>
+              <a:t>Applications deployed to cluster via </a:t>
+            </a:r>
+            <a:r>
+              <a:rPr lang="en-GB" sz="3200" dirty="0" err="1"/>
+              <a:t>yaml</a:t>
+            </a:r>
+            <a:r>
+              <a:rPr lang="en-GB" sz="3200" dirty="0"/>
+              <a:t> files</a:t>
+            </a:r>
+          </a:p>
+          <a:p>
+            <a:pPr marL="0" indent="0">
+              <a:buNone/>
+            </a:pPr>
+            <a:r>
+              <a:rPr lang="en-GB" sz="3200" dirty="0"/>
+              <a:t>Managed by Azure-CLI/</a:t>
+            </a:r>
+            <a:r>
+              <a:rPr lang="en-GB" sz="3200" dirty="0" err="1"/>
+              <a:t>powershell</a:t>
+            </a:r>
+            <a:r>
+              <a:rPr lang="en-GB" sz="3200" dirty="0"/>
+              <a:t> and </a:t>
+            </a:r>
+            <a:r>
+              <a:rPr lang="en-GB" sz="3200" dirty="0" err="1"/>
+              <a:t>kubectl</a:t>
+            </a:r>
             <a:endParaRPr lang="en-GB" sz="3200" dirty="0"/>
           </a:p>
         </p:txBody>
@@ -8849,7 +9598,7 @@
     </p:spTree>
     <p:extLst>
       <p:ext uri="{BB962C8B-B14F-4D97-AF65-F5344CB8AC3E}">
-        <p14:creationId xmlns:p14="http://schemas.microsoft.com/office/powerpoint/2010/main" val="4113174784"/>
+        <p14:creationId xmlns:p14="http://schemas.microsoft.com/office/powerpoint/2010/main" val="3069965736"/>
       </p:ext>
     </p:extLst>
   </p:cSld>
@@ -9010,6 +9759,274 @@
       </p:grpSpPr>
       <p:sp>
         <p:nvSpPr>
+          <p:cNvPr id="4" name="Title 3"/>
+          <p:cNvSpPr>
+            <a:spLocks noGrp="1"/>
+          </p:cNvSpPr>
+          <p:nvPr>
+            <p:ph type="title"/>
+          </p:nvPr>
+        </p:nvSpPr>
+        <p:spPr/>
+        <p:txBody>
+          <a:bodyPr>
+            <a:normAutofit/>
+          </a:bodyPr>
+          <a:lstStyle/>
+          <a:p>
+            <a:r>
+              <a:rPr lang="en-GB" dirty="0">
+                <a:solidFill>
+                  <a:schemeClr val="accent1"/>
+                </a:solidFill>
+              </a:rPr>
+              <a:t>Demo</a:t>
+            </a:r>
+          </a:p>
+        </p:txBody>
+      </p:sp>
+      <p:sp>
+        <p:nvSpPr>
+          <p:cNvPr id="2" name="Text Placeholder 1"/>
+          <p:cNvSpPr>
+            <a:spLocks noGrp="1"/>
+          </p:cNvSpPr>
+          <p:nvPr>
+            <p:ph type="body" idx="1"/>
+          </p:nvPr>
+        </p:nvSpPr>
+        <p:spPr/>
+        <p:txBody>
+          <a:bodyPr/>
+          <a:lstStyle/>
+          <a:p>
+            <a:endParaRPr lang="en-GB" dirty="0"/>
+          </a:p>
+        </p:txBody>
+      </p:sp>
+    </p:spTree>
+    <p:extLst>
+      <p:ext uri="{BB962C8B-B14F-4D97-AF65-F5344CB8AC3E}">
+        <p14:creationId xmlns:p14="http://schemas.microsoft.com/office/powerpoint/2010/main" val="2917938358"/>
+      </p:ext>
+    </p:extLst>
+  </p:cSld>
+  <p:clrMapOvr>
+    <a:masterClrMapping/>
+  </p:clrMapOvr>
+</p:sld>
+</file>
+
+<file path=ppt/slides/slide41.xml><?xml version="1.0" encoding="utf-8"?>
+<p:sld xmlns:a="http://schemas.openxmlformats.org/drawingml/2006/main" xmlns:r="http://schemas.openxmlformats.org/officeDocument/2006/relationships" xmlns:p="http://schemas.openxmlformats.org/presentationml/2006/main">
+  <p:cSld>
+    <p:spTree>
+      <p:nvGrpSpPr>
+        <p:cNvPr id="1" name=""/>
+        <p:cNvGrpSpPr/>
+        <p:nvPr/>
+      </p:nvGrpSpPr>
+      <p:grpSpPr>
+        <a:xfrm>
+          <a:off x="0" y="0"/>
+          <a:ext cx="0" cy="0"/>
+          <a:chOff x="0" y="0"/>
+          <a:chExt cx="0" cy="0"/>
+        </a:xfrm>
+      </p:grpSpPr>
+      <p:sp>
+        <p:nvSpPr>
+          <p:cNvPr id="4" name="Title 3"/>
+          <p:cNvSpPr>
+            <a:spLocks noGrp="1"/>
+          </p:cNvSpPr>
+          <p:nvPr>
+            <p:ph type="title"/>
+          </p:nvPr>
+        </p:nvSpPr>
+        <p:spPr/>
+        <p:txBody>
+          <a:bodyPr>
+            <a:normAutofit/>
+          </a:bodyPr>
+          <a:lstStyle/>
+          <a:p>
+            <a:r>
+              <a:rPr lang="en-GB" dirty="0">
+                <a:solidFill>
+                  <a:schemeClr val="accent1"/>
+                </a:solidFill>
+              </a:rPr>
+              <a:t>Docker EE for </a:t>
+            </a:r>
+            <a:r>
+              <a:rPr lang="en-GB" dirty="0" err="1">
+                <a:solidFill>
+                  <a:schemeClr val="accent1"/>
+                </a:solidFill>
+              </a:rPr>
+              <a:t>Azuzre</a:t>
+            </a:r>
+            <a:endParaRPr lang="en-GB" dirty="0">
+              <a:solidFill>
+                <a:schemeClr val="accent1"/>
+              </a:solidFill>
+            </a:endParaRPr>
+          </a:p>
+        </p:txBody>
+      </p:sp>
+      <p:sp>
+        <p:nvSpPr>
+          <p:cNvPr id="2" name="Text Placeholder 1"/>
+          <p:cNvSpPr>
+            <a:spLocks noGrp="1"/>
+          </p:cNvSpPr>
+          <p:nvPr>
+            <p:ph type="body" idx="1"/>
+          </p:nvPr>
+        </p:nvSpPr>
+        <p:spPr/>
+        <p:txBody>
+          <a:bodyPr/>
+          <a:lstStyle/>
+          <a:p>
+            <a:endParaRPr lang="en-GB" dirty="0"/>
+          </a:p>
+        </p:txBody>
+      </p:sp>
+    </p:spTree>
+    <p:extLst>
+      <p:ext uri="{BB962C8B-B14F-4D97-AF65-F5344CB8AC3E}">
+        <p14:creationId xmlns:p14="http://schemas.microsoft.com/office/powerpoint/2010/main" val="3610026559"/>
+      </p:ext>
+    </p:extLst>
+  </p:cSld>
+  <p:clrMapOvr>
+    <a:masterClrMapping/>
+  </p:clrMapOvr>
+</p:sld>
+</file>
+
+<file path=ppt/slides/slide42.xml><?xml version="1.0" encoding="utf-8"?>
+<p:sld xmlns:a="http://schemas.openxmlformats.org/drawingml/2006/main" xmlns:r="http://schemas.openxmlformats.org/officeDocument/2006/relationships" xmlns:p="http://schemas.openxmlformats.org/presentationml/2006/main">
+  <p:cSld>
+    <p:spTree>
+      <p:nvGrpSpPr>
+        <p:cNvPr id="1" name=""/>
+        <p:cNvGrpSpPr/>
+        <p:nvPr/>
+      </p:nvGrpSpPr>
+      <p:grpSpPr>
+        <a:xfrm>
+          <a:off x="0" y="0"/>
+          <a:ext cx="0" cy="0"/>
+          <a:chOff x="0" y="0"/>
+          <a:chExt cx="0" cy="0"/>
+        </a:xfrm>
+      </p:grpSpPr>
+      <p:sp>
+        <p:nvSpPr>
+          <p:cNvPr id="6" name="Title 5"/>
+          <p:cNvSpPr>
+            <a:spLocks noGrp="1"/>
+          </p:cNvSpPr>
+          <p:nvPr>
+            <p:ph type="title"/>
+          </p:nvPr>
+        </p:nvSpPr>
+        <p:spPr>
+          <a:xfrm>
+            <a:off x="331596" y="562708"/>
+            <a:ext cx="10184004" cy="713433"/>
+          </a:xfrm>
+        </p:spPr>
+        <p:txBody>
+          <a:bodyPr>
+            <a:normAutofit/>
+          </a:bodyPr>
+          <a:lstStyle/>
+          <a:p>
+            <a:r>
+              <a:rPr lang="en-GB" dirty="0">
+                <a:solidFill>
+                  <a:schemeClr val="accent1">
+                    <a:lumMod val="75000"/>
+                  </a:schemeClr>
+                </a:solidFill>
+              </a:rPr>
+              <a:t>Docker EE for Azure</a:t>
+            </a:r>
+          </a:p>
+        </p:txBody>
+      </p:sp>
+      <p:sp>
+        <p:nvSpPr>
+          <p:cNvPr id="3" name="Subtitle 2"/>
+          <p:cNvSpPr>
+            <a:spLocks noGrp="1"/>
+          </p:cNvSpPr>
+          <p:nvPr>
+            <p:ph idx="1"/>
+          </p:nvPr>
+        </p:nvSpPr>
+        <p:spPr/>
+        <p:txBody>
+          <a:bodyPr>
+            <a:normAutofit/>
+          </a:bodyPr>
+          <a:lstStyle/>
+          <a:p>
+            <a:pPr marL="0" indent="0">
+              <a:buNone/>
+            </a:pPr>
+            <a:r>
+              <a:rPr lang="en-GB" sz="3200" dirty="0">
+                <a:hlinkClick r:id="rId2"/>
+              </a:rPr>
+              <a:t>https://store.docker.com/editions/enterprise/docker-ee-azure</a:t>
+            </a:r>
+            <a:endParaRPr lang="en-GB" sz="3200" dirty="0"/>
+          </a:p>
+          <a:p>
+            <a:pPr marL="0" indent="0">
+              <a:buNone/>
+            </a:pPr>
+            <a:endParaRPr lang="en-GB" sz="3200" dirty="0"/>
+          </a:p>
+        </p:txBody>
+      </p:sp>
+    </p:spTree>
+    <p:extLst>
+      <p:ext uri="{BB962C8B-B14F-4D97-AF65-F5344CB8AC3E}">
+        <p14:creationId xmlns:p14="http://schemas.microsoft.com/office/powerpoint/2010/main" val="4113174784"/>
+      </p:ext>
+    </p:extLst>
+  </p:cSld>
+  <p:clrMapOvr>
+    <a:masterClrMapping/>
+  </p:clrMapOvr>
+</p:sld>
+</file>
+
+<file path=ppt/slides/slide43.xml><?xml version="1.0" encoding="utf-8"?>
+<p:sld xmlns:a="http://schemas.openxmlformats.org/drawingml/2006/main" xmlns:r="http://schemas.openxmlformats.org/officeDocument/2006/relationships" xmlns:p="http://schemas.openxmlformats.org/presentationml/2006/main">
+  <p:cSld>
+    <p:spTree>
+      <p:nvGrpSpPr>
+        <p:cNvPr id="1" name=""/>
+        <p:cNvGrpSpPr/>
+        <p:nvPr/>
+      </p:nvGrpSpPr>
+      <p:grpSpPr>
+        <a:xfrm>
+          <a:off x="0" y="0"/>
+          <a:ext cx="0" cy="0"/>
+          <a:chOff x="0" y="0"/>
+          <a:chExt cx="0" cy="0"/>
+        </a:xfrm>
+      </p:grpSpPr>
+      <p:sp>
+        <p:nvSpPr>
           <p:cNvPr id="2" name="Title 1">
             <a:extLst>
               <a:ext uri="{FF2B5EF4-FFF2-40B4-BE49-F238E27FC236}">
@@ -9106,7 +10123,7 @@
 </p:sld>
 </file>
 
-<file path=ppt/slides/slide41.xml><?xml version="1.0" encoding="utf-8"?>
+<file path=ppt/slides/slide44.xml><?xml version="1.0" encoding="utf-8"?>
 <p:sld xmlns:a="http://schemas.openxmlformats.org/drawingml/2006/main" xmlns:r="http://schemas.openxmlformats.org/officeDocument/2006/relationships" xmlns:p="http://schemas.openxmlformats.org/presentationml/2006/main">
   <p:cSld>
     <p:spTree>

</xml_diff>